<commit_message>
New git workflow files
Updated links and new pdf version
</commit_message>
<xml_diff>
--- a/git_workflow.pptx
+++ b/git_workflow.pptx
@@ -2,10 +2,13 @@
 <file path=ppt/presentation.xml><?xml version="1.0" encoding="utf-8"?>
 <p:presentation xmlns:a="http://schemas.openxmlformats.org/drawingml/2006/main" xmlns:r="http://schemas.openxmlformats.org/officeDocument/2006/relationships" xmlns:p="http://schemas.openxmlformats.org/presentationml/2006/main" saveSubsetFonts="1">
   <p:sldMasterIdLst>
-    <p:sldMasterId id="2147483660" r:id="rId4"/>
+    <p:sldMasterId id="2147483660" r:id="rId1"/>
   </p:sldMasterIdLst>
+  <p:notesMasterIdLst>
+    <p:notesMasterId r:id="rId3"/>
+  </p:notesMasterIdLst>
   <p:sldIdLst>
-    <p:sldId id="256" r:id="rId5"/>
+    <p:sldId id="256" r:id="rId2"/>
   </p:sldIdLst>
   <p:sldSz cx="6858000" cy="12192000"/>
   <p:notesSz cx="6858000" cy="9144000"/>
@@ -115,12 +118,696 @@
 <file path=ppt/revisionInfo.xml><?xml version="1.0" encoding="utf-8"?>
 <p1510:revInfo xmlns:a="http://schemas.openxmlformats.org/drawingml/2006/main" xmlns:r="http://schemas.openxmlformats.org/officeDocument/2006/relationships" xmlns:p1510="http://schemas.microsoft.com/office/powerpoint/2015/10/main">
   <p1510:revLst>
-    <p1510:client id="{05A707A2-7F39-8D91-EB4D-FE68448CA00B}" v="23" dt="2025-04-24T18:35:23.999"/>
-    <p1510:client id="{0B913866-AF46-F608-9FC2-F83062CCA456}" v="13" dt="2025-04-24T19:44:46.165"/>
-    <p1510:client id="{510F7EDB-7369-79A4-3F61-6640E18EDBBC}" v="118" dt="2025-04-24T18:40:21.318"/>
-    <p1510:client id="{5FDED277-8D0B-4AC4-99AB-E71FDF83E345}" v="28" dt="2025-04-24T17:25:44.574"/>
+    <p1510:client id="{28BD8CBC-1F55-4B5C-ACF6-3B202AAB56AF}" v="3" dt="2025-06-27T12:49:08.008"/>
   </p1510:revLst>
 </p1510:revInfo>
+</file>
+
+<file path=ppt/changesInfos/changesInfo1.xml><?xml version="1.0" encoding="utf-8"?>
+<pc:chgInfo xmlns:a="http://schemas.openxmlformats.org/drawingml/2006/main" xmlns:r="http://schemas.openxmlformats.org/officeDocument/2006/relationships" xmlns:ac="http://schemas.microsoft.com/office/drawing/2013/main/command" xmlns:pc="http://schemas.microsoft.com/office/powerpoint/2013/main/command">
+  <pc:docChgLst>
+    <pc:chgData name="Aoife McCarthy" userId="50aeefd3-e393-4d37-a1da-69d27c385d52" providerId="ADAL" clId="{5FDED277-8D0B-4AC4-99AB-E71FDF83E345}"/>
+    <pc:docChg chg="undo custSel modSld">
+      <pc:chgData name="Aoife McCarthy" userId="50aeefd3-e393-4d37-a1da-69d27c385d52" providerId="ADAL" clId="{5FDED277-8D0B-4AC4-99AB-E71FDF83E345}" dt="2025-04-24T17:25:38.153" v="434" actId="1076"/>
+      <pc:docMkLst>
+        <pc:docMk/>
+      </pc:docMkLst>
+      <pc:sldChg chg="addSp delSp modSp mod">
+        <pc:chgData name="Aoife McCarthy" userId="50aeefd3-e393-4d37-a1da-69d27c385d52" providerId="ADAL" clId="{5FDED277-8D0B-4AC4-99AB-E71FDF83E345}" dt="2025-04-24T17:25:38.153" v="434" actId="1076"/>
+        <pc:sldMkLst>
+          <pc:docMk/>
+          <pc:sldMk cId="4239130025" sldId="256"/>
+        </pc:sldMkLst>
+        <pc:spChg chg="mod">
+          <ac:chgData name="Aoife McCarthy" userId="50aeefd3-e393-4d37-a1da-69d27c385d52" providerId="ADAL" clId="{5FDED277-8D0B-4AC4-99AB-E71FDF83E345}" dt="2025-04-24T17:07:45.083" v="39" actId="1076"/>
+          <ac:spMkLst>
+            <pc:docMk/>
+            <pc:sldMk cId="4239130025" sldId="256"/>
+            <ac:spMk id="5" creationId="{D1E0BF4D-6ECD-CC48-0E24-F61695FE7C9D}"/>
+          </ac:spMkLst>
+        </pc:spChg>
+        <pc:spChg chg="mod">
+          <ac:chgData name="Aoife McCarthy" userId="50aeefd3-e393-4d37-a1da-69d27c385d52" providerId="ADAL" clId="{5FDED277-8D0B-4AC4-99AB-E71FDF83E345}" dt="2025-04-24T17:18:22.814" v="305" actId="1076"/>
+          <ac:spMkLst>
+            <pc:docMk/>
+            <pc:sldMk cId="4239130025" sldId="256"/>
+            <ac:spMk id="16" creationId="{DD52FCC5-82B4-3EA8-0BCB-473BF285603C}"/>
+          </ac:spMkLst>
+        </pc:spChg>
+        <pc:spChg chg="mod">
+          <ac:chgData name="Aoife McCarthy" userId="50aeefd3-e393-4d37-a1da-69d27c385d52" providerId="ADAL" clId="{5FDED277-8D0B-4AC4-99AB-E71FDF83E345}" dt="2025-04-24T17:19:15.004" v="310" actId="14100"/>
+          <ac:spMkLst>
+            <pc:docMk/>
+            <pc:sldMk cId="4239130025" sldId="256"/>
+            <ac:spMk id="18" creationId="{76EA7B2F-E637-9484-8A64-0B877E6D8B1C}"/>
+          </ac:spMkLst>
+        </pc:spChg>
+        <pc:spChg chg="mod">
+          <ac:chgData name="Aoife McCarthy" userId="50aeefd3-e393-4d37-a1da-69d27c385d52" providerId="ADAL" clId="{5FDED277-8D0B-4AC4-99AB-E71FDF83E345}" dt="2025-04-24T17:19:18.343" v="311" actId="14100"/>
+          <ac:spMkLst>
+            <pc:docMk/>
+            <pc:sldMk cId="4239130025" sldId="256"/>
+            <ac:spMk id="19" creationId="{434A00D5-6CCE-F5EA-5182-1299A79F4EEC}"/>
+          </ac:spMkLst>
+        </pc:spChg>
+        <pc:spChg chg="mod">
+          <ac:chgData name="Aoife McCarthy" userId="50aeefd3-e393-4d37-a1da-69d27c385d52" providerId="ADAL" clId="{5FDED277-8D0B-4AC4-99AB-E71FDF83E345}" dt="2025-04-24T17:07:18.039" v="36" actId="1076"/>
+          <ac:spMkLst>
+            <pc:docMk/>
+            <pc:sldMk cId="4239130025" sldId="256"/>
+            <ac:spMk id="22" creationId="{AACC18D0-D831-1286-8083-C8EE0B867BD0}"/>
+          </ac:spMkLst>
+        </pc:spChg>
+        <pc:spChg chg="mod">
+          <ac:chgData name="Aoife McCarthy" userId="50aeefd3-e393-4d37-a1da-69d27c385d52" providerId="ADAL" clId="{5FDED277-8D0B-4AC4-99AB-E71FDF83E345}" dt="2025-04-24T17:05:09.132" v="10" actId="13822"/>
+          <ac:spMkLst>
+            <pc:docMk/>
+            <pc:sldMk cId="4239130025" sldId="256"/>
+            <ac:spMk id="52" creationId="{C6AF0E97-28A0-FF93-E120-CC7752BF91D9}"/>
+          </ac:spMkLst>
+        </pc:spChg>
+        <pc:spChg chg="mod">
+          <ac:chgData name="Aoife McCarthy" userId="50aeefd3-e393-4d37-a1da-69d27c385d52" providerId="ADAL" clId="{5FDED277-8D0B-4AC4-99AB-E71FDF83E345}" dt="2025-04-24T17:06:40.022" v="29" actId="1076"/>
+          <ac:spMkLst>
+            <pc:docMk/>
+            <pc:sldMk cId="4239130025" sldId="256"/>
+            <ac:spMk id="53" creationId="{F994A7D6-275E-7AFA-F62F-C9F29487DE68}"/>
+          </ac:spMkLst>
+        </pc:spChg>
+        <pc:spChg chg="add mod">
+          <ac:chgData name="Aoife McCarthy" userId="50aeefd3-e393-4d37-a1da-69d27c385d52" providerId="ADAL" clId="{5FDED277-8D0B-4AC4-99AB-E71FDF83E345}" dt="2025-04-24T17:05:31.419" v="15" actId="1076"/>
+          <ac:spMkLst>
+            <pc:docMk/>
+            <pc:sldMk cId="4239130025" sldId="256"/>
+            <ac:spMk id="54" creationId="{10E85E30-0469-00E3-B400-1CFC45A334EE}"/>
+          </ac:spMkLst>
+        </pc:spChg>
+        <pc:spChg chg="add mod">
+          <ac:chgData name="Aoife McCarthy" userId="50aeefd3-e393-4d37-a1da-69d27c385d52" providerId="ADAL" clId="{5FDED277-8D0B-4AC4-99AB-E71FDF83E345}" dt="2025-04-24T17:05:40.897" v="17" actId="14100"/>
+          <ac:spMkLst>
+            <pc:docMk/>
+            <pc:sldMk cId="4239130025" sldId="256"/>
+            <ac:spMk id="55" creationId="{5E041F27-B70C-3016-384B-28D246ABD4A5}"/>
+          </ac:spMkLst>
+        </pc:spChg>
+        <pc:spChg chg="add mod">
+          <ac:chgData name="Aoife McCarthy" userId="50aeefd3-e393-4d37-a1da-69d27c385d52" providerId="ADAL" clId="{5FDED277-8D0B-4AC4-99AB-E71FDF83E345}" dt="2025-04-24T17:06:58.030" v="30" actId="14100"/>
+          <ac:spMkLst>
+            <pc:docMk/>
+            <pc:sldMk cId="4239130025" sldId="256"/>
+            <ac:spMk id="56" creationId="{4DFD14FB-676A-37D0-82A6-6387A0580B0F}"/>
+          </ac:spMkLst>
+        </pc:spChg>
+        <pc:spChg chg="add mod">
+          <ac:chgData name="Aoife McCarthy" userId="50aeefd3-e393-4d37-a1da-69d27c385d52" providerId="ADAL" clId="{5FDED277-8D0B-4AC4-99AB-E71FDF83E345}" dt="2025-04-24T17:06:23.011" v="26" actId="1076"/>
+          <ac:spMkLst>
+            <pc:docMk/>
+            <pc:sldMk cId="4239130025" sldId="256"/>
+            <ac:spMk id="58" creationId="{FB9F57AE-BB66-6EE4-106F-37AA1EED5616}"/>
+          </ac:spMkLst>
+        </pc:spChg>
+        <pc:spChg chg="add mod">
+          <ac:chgData name="Aoife McCarthy" userId="50aeefd3-e393-4d37-a1da-69d27c385d52" providerId="ADAL" clId="{5FDED277-8D0B-4AC4-99AB-E71FDF83E345}" dt="2025-04-24T17:06:33.543" v="28" actId="1076"/>
+          <ac:spMkLst>
+            <pc:docMk/>
+            <pc:sldMk cId="4239130025" sldId="256"/>
+            <ac:spMk id="59" creationId="{F93A77AD-C5DF-53FB-7C1F-CDDA57CA5224}"/>
+          </ac:spMkLst>
+        </pc:spChg>
+        <pc:spChg chg="add mod">
+          <ac:chgData name="Aoife McCarthy" userId="50aeefd3-e393-4d37-a1da-69d27c385d52" providerId="ADAL" clId="{5FDED277-8D0B-4AC4-99AB-E71FDF83E345}" dt="2025-04-24T17:07:24.085" v="38" actId="1076"/>
+          <ac:spMkLst>
+            <pc:docMk/>
+            <pc:sldMk cId="4239130025" sldId="256"/>
+            <ac:spMk id="60" creationId="{9E3E7045-4B3A-5B5B-CA18-5F623B854A37}"/>
+          </ac:spMkLst>
+        </pc:spChg>
+        <pc:spChg chg="add mod">
+          <ac:chgData name="Aoife McCarthy" userId="50aeefd3-e393-4d37-a1da-69d27c385d52" providerId="ADAL" clId="{5FDED277-8D0B-4AC4-99AB-E71FDF83E345}" dt="2025-04-24T17:08:31.907" v="45" actId="14100"/>
+          <ac:spMkLst>
+            <pc:docMk/>
+            <pc:sldMk cId="4239130025" sldId="256"/>
+            <ac:spMk id="61" creationId="{072FE506-23EE-05DF-EC4F-B6BEB756BAAA}"/>
+          </ac:spMkLst>
+        </pc:spChg>
+        <pc:spChg chg="add mod">
+          <ac:chgData name="Aoife McCarthy" userId="50aeefd3-e393-4d37-a1da-69d27c385d52" providerId="ADAL" clId="{5FDED277-8D0B-4AC4-99AB-E71FDF83E345}" dt="2025-04-24T17:08:46.547" v="48" actId="14100"/>
+          <ac:spMkLst>
+            <pc:docMk/>
+            <pc:sldMk cId="4239130025" sldId="256"/>
+            <ac:spMk id="62" creationId="{63065B51-8B52-322D-99FC-9EE6B55F9A15}"/>
+          </ac:spMkLst>
+        </pc:spChg>
+        <pc:spChg chg="add mod">
+          <ac:chgData name="Aoife McCarthy" userId="50aeefd3-e393-4d37-a1da-69d27c385d52" providerId="ADAL" clId="{5FDED277-8D0B-4AC4-99AB-E71FDF83E345}" dt="2025-04-24T17:09:28.990" v="56" actId="14100"/>
+          <ac:spMkLst>
+            <pc:docMk/>
+            <pc:sldMk cId="4239130025" sldId="256"/>
+            <ac:spMk id="63" creationId="{07EC6DF1-7D70-C33A-A50C-194B4AE50D80}"/>
+          </ac:spMkLst>
+        </pc:spChg>
+        <pc:spChg chg="add mod">
+          <ac:chgData name="Aoife McCarthy" userId="50aeefd3-e393-4d37-a1da-69d27c385d52" providerId="ADAL" clId="{5FDED277-8D0B-4AC4-99AB-E71FDF83E345}" dt="2025-04-24T17:18:11.624" v="304" actId="14100"/>
+          <ac:spMkLst>
+            <pc:docMk/>
+            <pc:sldMk cId="4239130025" sldId="256"/>
+            <ac:spMk id="1024" creationId="{219B7779-9995-96CB-ECC8-CA95A09AEEF4}"/>
+          </ac:spMkLst>
+        </pc:spChg>
+        <pc:spChg chg="add del mod">
+          <ac:chgData name="Aoife McCarthy" userId="50aeefd3-e393-4d37-a1da-69d27c385d52" providerId="ADAL" clId="{5FDED277-8D0B-4AC4-99AB-E71FDF83E345}" dt="2025-04-24T17:18:36.719" v="309" actId="14100"/>
+          <ac:spMkLst>
+            <pc:docMk/>
+            <pc:sldMk cId="4239130025" sldId="256"/>
+            <ac:spMk id="1025" creationId="{97FBBEF8-9728-E238-8DE8-DE55D50FDB4D}"/>
+          </ac:spMkLst>
+        </pc:spChg>
+        <pc:spChg chg="add mod">
+          <ac:chgData name="Aoife McCarthy" userId="50aeefd3-e393-4d37-a1da-69d27c385d52" providerId="ADAL" clId="{5FDED277-8D0B-4AC4-99AB-E71FDF83E345}" dt="2025-04-24T17:11:57.903" v="81" actId="14100"/>
+          <ac:spMkLst>
+            <pc:docMk/>
+            <pc:sldMk cId="4239130025" sldId="256"/>
+            <ac:spMk id="1029" creationId="{3F6BCA04-9735-D812-38F4-C6A351DD230D}"/>
+          </ac:spMkLst>
+        </pc:spChg>
+        <pc:spChg chg="add mod">
+          <ac:chgData name="Aoife McCarthy" userId="50aeefd3-e393-4d37-a1da-69d27c385d52" providerId="ADAL" clId="{5FDED277-8D0B-4AC4-99AB-E71FDF83E345}" dt="2025-04-24T17:16:05.293" v="200" actId="1076"/>
+          <ac:spMkLst>
+            <pc:docMk/>
+            <pc:sldMk cId="4239130025" sldId="256"/>
+            <ac:spMk id="1030" creationId="{392F6C2F-E94B-AFA1-363C-D8331AE3044C}"/>
+          </ac:spMkLst>
+        </pc:spChg>
+        <pc:spChg chg="add mod">
+          <ac:chgData name="Aoife McCarthy" userId="50aeefd3-e393-4d37-a1da-69d27c385d52" providerId="ADAL" clId="{5FDED277-8D0B-4AC4-99AB-E71FDF83E345}" dt="2025-04-24T17:18:26.157" v="306" actId="1076"/>
+          <ac:spMkLst>
+            <pc:docMk/>
+            <pc:sldMk cId="4239130025" sldId="256"/>
+            <ac:spMk id="1032" creationId="{8C6926FE-C66F-08EA-C43B-D9C4DF35DF6A}"/>
+          </ac:spMkLst>
+        </pc:spChg>
+        <pc:spChg chg="add mod">
+          <ac:chgData name="Aoife McCarthy" userId="50aeefd3-e393-4d37-a1da-69d27c385d52" providerId="ADAL" clId="{5FDED277-8D0B-4AC4-99AB-E71FDF83E345}" dt="2025-04-24T17:20:00.391" v="313" actId="17032"/>
+          <ac:spMkLst>
+            <pc:docMk/>
+            <pc:sldMk cId="4239130025" sldId="256"/>
+            <ac:spMk id="1033" creationId="{42B86C0A-2D96-FED9-661B-CF223F9A93AF}"/>
+          </ac:spMkLst>
+        </pc:spChg>
+        <pc:spChg chg="add mod">
+          <ac:chgData name="Aoife McCarthy" userId="50aeefd3-e393-4d37-a1da-69d27c385d52" providerId="ADAL" clId="{5FDED277-8D0B-4AC4-99AB-E71FDF83E345}" dt="2025-04-24T17:22:48.875" v="391" actId="20577"/>
+          <ac:spMkLst>
+            <pc:docMk/>
+            <pc:sldMk cId="4239130025" sldId="256"/>
+            <ac:spMk id="1034" creationId="{20AEB358-54E8-FAAE-2443-F0E8AF024975}"/>
+          </ac:spMkLst>
+        </pc:spChg>
+        <pc:spChg chg="add mod">
+          <ac:chgData name="Aoife McCarthy" userId="50aeefd3-e393-4d37-a1da-69d27c385d52" providerId="ADAL" clId="{5FDED277-8D0B-4AC4-99AB-E71FDF83E345}" dt="2025-04-24T17:25:38.153" v="434" actId="1076"/>
+          <ac:spMkLst>
+            <pc:docMk/>
+            <pc:sldMk cId="4239130025" sldId="256"/>
+            <ac:spMk id="1035" creationId="{04090C6C-FF4C-C194-8180-147CCDB13D53}"/>
+          </ac:spMkLst>
+        </pc:spChg>
+        <pc:spChg chg="add mod">
+          <ac:chgData name="Aoife McCarthy" userId="50aeefd3-e393-4d37-a1da-69d27c385d52" providerId="ADAL" clId="{5FDED277-8D0B-4AC4-99AB-E71FDF83E345}" dt="2025-04-24T17:23:13.028" v="429" actId="14100"/>
+          <ac:spMkLst>
+            <pc:docMk/>
+            <pc:sldMk cId="4239130025" sldId="256"/>
+            <ac:spMk id="1036" creationId="{771BD3DE-8076-3F44-7221-B38A35C4758A}"/>
+          </ac:spMkLst>
+        </pc:spChg>
+        <pc:picChg chg="mod">
+          <ac:chgData name="Aoife McCarthy" userId="50aeefd3-e393-4d37-a1da-69d27c385d52" providerId="ADAL" clId="{5FDED277-8D0B-4AC4-99AB-E71FDF83E345}" dt="2025-04-24T17:18:22.814" v="305" actId="1076"/>
+          <ac:picMkLst>
+            <pc:docMk/>
+            <pc:sldMk cId="4239130025" sldId="256"/>
+            <ac:picMk id="38" creationId="{C5123B90-BAAD-3FF2-6DC6-EF33FF17575A}"/>
+          </ac:picMkLst>
+        </pc:picChg>
+      </pc:sldChg>
+    </pc:docChg>
+  </pc:docChgLst>
+  <pc:docChgLst>
+    <pc:chgData name="Aoife McCarthy" userId="50aeefd3-e393-4d37-a1da-69d27c385d52" providerId="ADAL" clId="{28BD8CBC-1F55-4B5C-ACF6-3B202AAB56AF}"/>
+    <pc:docChg chg="modSld">
+      <pc:chgData name="Aoife McCarthy" userId="50aeefd3-e393-4d37-a1da-69d27c385d52" providerId="ADAL" clId="{28BD8CBC-1F55-4B5C-ACF6-3B202AAB56AF}" dt="2025-06-27T12:50:51.262" v="25" actId="1076"/>
+      <pc:docMkLst>
+        <pc:docMk/>
+      </pc:docMkLst>
+      <pc:sldChg chg="addSp modSp mod">
+        <pc:chgData name="Aoife McCarthy" userId="50aeefd3-e393-4d37-a1da-69d27c385d52" providerId="ADAL" clId="{28BD8CBC-1F55-4B5C-ACF6-3B202AAB56AF}" dt="2025-06-27T12:50:51.262" v="25" actId="1076"/>
+        <pc:sldMkLst>
+          <pc:docMk/>
+          <pc:sldMk cId="4239130025" sldId="256"/>
+        </pc:sldMkLst>
+        <pc:spChg chg="add mod">
+          <ac:chgData name="Aoife McCarthy" userId="50aeefd3-e393-4d37-a1da-69d27c385d52" providerId="ADAL" clId="{28BD8CBC-1F55-4B5C-ACF6-3B202AAB56AF}" dt="2025-06-27T12:50:51.262" v="25" actId="1076"/>
+          <ac:spMkLst>
+            <pc:docMk/>
+            <pc:sldMk cId="4239130025" sldId="256"/>
+            <ac:spMk id="2" creationId="{A0F4870F-B95F-C299-804E-32BC8FF36DE3}"/>
+          </ac:spMkLst>
+        </pc:spChg>
+      </pc:sldChg>
+    </pc:docChg>
+  </pc:docChgLst>
+</pc:chgInfo>
+</file>
+
+<file path=ppt/notesMasters/notesMaster1.xml><?xml version="1.0" encoding="utf-8"?>
+<p:notesMaster xmlns:a="http://schemas.openxmlformats.org/drawingml/2006/main" xmlns:r="http://schemas.openxmlformats.org/officeDocument/2006/relationships" xmlns:p="http://schemas.openxmlformats.org/presentationml/2006/main">
+  <p:cSld>
+    <p:bg>
+      <p:bgRef idx="1001">
+        <a:schemeClr val="bg1"/>
+      </p:bgRef>
+    </p:bg>
+    <p:spTree>
+      <p:nvGrpSpPr>
+        <p:cNvPr id="1" name=""/>
+        <p:cNvGrpSpPr/>
+        <p:nvPr/>
+      </p:nvGrpSpPr>
+      <p:grpSpPr>
+        <a:xfrm>
+          <a:off x="0" y="0"/>
+          <a:ext cx="0" cy="0"/>
+          <a:chOff x="0" y="0"/>
+          <a:chExt cx="0" cy="0"/>
+        </a:xfrm>
+      </p:grpSpPr>
+      <p:sp>
+        <p:nvSpPr>
+          <p:cNvPr id="2" name="Header Placeholder 1"/>
+          <p:cNvSpPr>
+            <a:spLocks noGrp="1"/>
+          </p:cNvSpPr>
+          <p:nvPr>
+            <p:ph type="hdr" sz="quarter"/>
+          </p:nvPr>
+        </p:nvSpPr>
+        <p:spPr>
+          <a:xfrm>
+            <a:off x="0" y="0"/>
+            <a:ext cx="2971800" cy="458788"/>
+          </a:xfrm>
+          <a:prstGeom prst="rect">
+            <a:avLst/>
+          </a:prstGeom>
+        </p:spPr>
+        <p:txBody>
+          <a:bodyPr vert="horz" lIns="91440" tIns="45720" rIns="91440" bIns="45720" rtlCol="0"/>
+          <a:lstStyle>
+            <a:lvl1pPr algn="l">
+              <a:defRPr sz="1200"/>
+            </a:lvl1pPr>
+          </a:lstStyle>
+          <a:p>
+            <a:endParaRPr lang="en-GB"/>
+          </a:p>
+        </p:txBody>
+      </p:sp>
+      <p:sp>
+        <p:nvSpPr>
+          <p:cNvPr id="3" name="Date Placeholder 2"/>
+          <p:cNvSpPr>
+            <a:spLocks noGrp="1"/>
+          </p:cNvSpPr>
+          <p:nvPr>
+            <p:ph type="dt" idx="1"/>
+          </p:nvPr>
+        </p:nvSpPr>
+        <p:spPr>
+          <a:xfrm>
+            <a:off x="3884613" y="0"/>
+            <a:ext cx="2971800" cy="458788"/>
+          </a:xfrm>
+          <a:prstGeom prst="rect">
+            <a:avLst/>
+          </a:prstGeom>
+        </p:spPr>
+        <p:txBody>
+          <a:bodyPr vert="horz" lIns="91440" tIns="45720" rIns="91440" bIns="45720" rtlCol="0"/>
+          <a:lstStyle>
+            <a:lvl1pPr algn="r">
+              <a:defRPr sz="1200"/>
+            </a:lvl1pPr>
+          </a:lstStyle>
+          <a:p>
+            <a:fld id="{36B13AEA-D2B0-4615-A7CE-5DAEB0650100}" type="datetimeFigureOut">
+              <a:rPr lang="en-GB" smtClean="0"/>
+              <a:t>27/06/2025</a:t>
+            </a:fld>
+            <a:endParaRPr lang="en-GB"/>
+          </a:p>
+        </p:txBody>
+      </p:sp>
+      <p:sp>
+        <p:nvSpPr>
+          <p:cNvPr id="4" name="Slide Image Placeholder 3"/>
+          <p:cNvSpPr>
+            <a:spLocks noGrp="1" noRot="1" noChangeAspect="1"/>
+          </p:cNvSpPr>
+          <p:nvPr>
+            <p:ph type="sldImg" idx="2"/>
+          </p:nvPr>
+        </p:nvSpPr>
+        <p:spPr>
+          <a:xfrm>
+            <a:off x="2560638" y="1143000"/>
+            <a:ext cx="1736725" cy="3086100"/>
+          </a:xfrm>
+          <a:prstGeom prst="rect">
+            <a:avLst/>
+          </a:prstGeom>
+          <a:noFill/>
+          <a:ln w="12700">
+            <a:solidFill>
+              <a:prstClr val="black"/>
+            </a:solidFill>
+          </a:ln>
+        </p:spPr>
+        <p:txBody>
+          <a:bodyPr vert="horz" lIns="91440" tIns="45720" rIns="91440" bIns="45720" rtlCol="0" anchor="ctr"/>
+          <a:lstStyle/>
+          <a:p>
+            <a:endParaRPr lang="en-GB"/>
+          </a:p>
+        </p:txBody>
+      </p:sp>
+      <p:sp>
+        <p:nvSpPr>
+          <p:cNvPr id="5" name="Notes Placeholder 4"/>
+          <p:cNvSpPr>
+            <a:spLocks noGrp="1"/>
+          </p:cNvSpPr>
+          <p:nvPr>
+            <p:ph type="body" sz="quarter" idx="3"/>
+          </p:nvPr>
+        </p:nvSpPr>
+        <p:spPr>
+          <a:xfrm>
+            <a:off x="685800" y="4400550"/>
+            <a:ext cx="5486400" cy="3600450"/>
+          </a:xfrm>
+          <a:prstGeom prst="rect">
+            <a:avLst/>
+          </a:prstGeom>
+        </p:spPr>
+        <p:txBody>
+          <a:bodyPr vert="horz" lIns="91440" tIns="45720" rIns="91440" bIns="45720" rtlCol="0"/>
+          <a:lstStyle/>
+          <a:p>
+            <a:pPr lvl="0"/>
+            <a:r>
+              <a:rPr lang="en-US"/>
+              <a:t>Click to edit Master text styles</a:t>
+            </a:r>
+          </a:p>
+          <a:p>
+            <a:pPr lvl="1"/>
+            <a:r>
+              <a:rPr lang="en-US"/>
+              <a:t>Second level</a:t>
+            </a:r>
+          </a:p>
+          <a:p>
+            <a:pPr lvl="2"/>
+            <a:r>
+              <a:rPr lang="en-US"/>
+              <a:t>Third level</a:t>
+            </a:r>
+          </a:p>
+          <a:p>
+            <a:pPr lvl="3"/>
+            <a:r>
+              <a:rPr lang="en-US"/>
+              <a:t>Fourth level</a:t>
+            </a:r>
+          </a:p>
+          <a:p>
+            <a:pPr lvl="4"/>
+            <a:r>
+              <a:rPr lang="en-US"/>
+              <a:t>Fifth level</a:t>
+            </a:r>
+            <a:endParaRPr lang="en-GB"/>
+          </a:p>
+        </p:txBody>
+      </p:sp>
+      <p:sp>
+        <p:nvSpPr>
+          <p:cNvPr id="6" name="Footer Placeholder 5"/>
+          <p:cNvSpPr>
+            <a:spLocks noGrp="1"/>
+          </p:cNvSpPr>
+          <p:nvPr>
+            <p:ph type="ftr" sz="quarter" idx="4"/>
+          </p:nvPr>
+        </p:nvSpPr>
+        <p:spPr>
+          <a:xfrm>
+            <a:off x="0" y="8685213"/>
+            <a:ext cx="2971800" cy="458787"/>
+          </a:xfrm>
+          <a:prstGeom prst="rect">
+            <a:avLst/>
+          </a:prstGeom>
+        </p:spPr>
+        <p:txBody>
+          <a:bodyPr vert="horz" lIns="91440" tIns="45720" rIns="91440" bIns="45720" rtlCol="0" anchor="b"/>
+          <a:lstStyle>
+            <a:lvl1pPr algn="l">
+              <a:defRPr sz="1200"/>
+            </a:lvl1pPr>
+          </a:lstStyle>
+          <a:p>
+            <a:endParaRPr lang="en-GB"/>
+          </a:p>
+        </p:txBody>
+      </p:sp>
+      <p:sp>
+        <p:nvSpPr>
+          <p:cNvPr id="7" name="Slide Number Placeholder 6"/>
+          <p:cNvSpPr>
+            <a:spLocks noGrp="1"/>
+          </p:cNvSpPr>
+          <p:nvPr>
+            <p:ph type="sldNum" sz="quarter" idx="5"/>
+          </p:nvPr>
+        </p:nvSpPr>
+        <p:spPr>
+          <a:xfrm>
+            <a:off x="3884613" y="8685213"/>
+            <a:ext cx="2971800" cy="458787"/>
+          </a:xfrm>
+          <a:prstGeom prst="rect">
+            <a:avLst/>
+          </a:prstGeom>
+        </p:spPr>
+        <p:txBody>
+          <a:bodyPr vert="horz" lIns="91440" tIns="45720" rIns="91440" bIns="45720" rtlCol="0" anchor="b"/>
+          <a:lstStyle>
+            <a:lvl1pPr algn="r">
+              <a:defRPr sz="1200"/>
+            </a:lvl1pPr>
+          </a:lstStyle>
+          <a:p>
+            <a:fld id="{853201CA-7301-4E5C-8E75-BD85EDC7E966}" type="slidenum">
+              <a:rPr lang="en-GB" smtClean="0"/>
+              <a:t>‹#›</a:t>
+            </a:fld>
+            <a:endParaRPr lang="en-GB"/>
+          </a:p>
+        </p:txBody>
+      </p:sp>
+    </p:spTree>
+    <p:extLst>
+      <p:ext uri="{BB962C8B-B14F-4D97-AF65-F5344CB8AC3E}">
+        <p14:creationId xmlns:p14="http://schemas.microsoft.com/office/powerpoint/2010/main" val="3585307519"/>
+      </p:ext>
+    </p:extLst>
+  </p:cSld>
+  <p:clrMap bg1="lt1" tx1="dk1" bg2="lt2" tx2="dk2" accent1="accent1" accent2="accent2" accent3="accent3" accent4="accent4" accent5="accent5" accent6="accent6" hlink="hlink" folHlink="folHlink"/>
+  <p:notesStyle>
+    <a:lvl1pPr marL="0" algn="l" defTabSz="914400" rtl="0" eaLnBrk="1" latinLnBrk="0" hangingPunct="1">
+      <a:defRPr sz="1200" kern="1200">
+        <a:solidFill>
+          <a:schemeClr val="tx1"/>
+        </a:solidFill>
+        <a:latin typeface="+mn-lt"/>
+        <a:ea typeface="+mn-ea"/>
+        <a:cs typeface="+mn-cs"/>
+      </a:defRPr>
+    </a:lvl1pPr>
+    <a:lvl2pPr marL="457200" algn="l" defTabSz="914400" rtl="0" eaLnBrk="1" latinLnBrk="0" hangingPunct="1">
+      <a:defRPr sz="1200" kern="1200">
+        <a:solidFill>
+          <a:schemeClr val="tx1"/>
+        </a:solidFill>
+        <a:latin typeface="+mn-lt"/>
+        <a:ea typeface="+mn-ea"/>
+        <a:cs typeface="+mn-cs"/>
+      </a:defRPr>
+    </a:lvl2pPr>
+    <a:lvl3pPr marL="914400" algn="l" defTabSz="914400" rtl="0" eaLnBrk="1" latinLnBrk="0" hangingPunct="1">
+      <a:defRPr sz="1200" kern="1200">
+        <a:solidFill>
+          <a:schemeClr val="tx1"/>
+        </a:solidFill>
+        <a:latin typeface="+mn-lt"/>
+        <a:ea typeface="+mn-ea"/>
+        <a:cs typeface="+mn-cs"/>
+      </a:defRPr>
+    </a:lvl3pPr>
+    <a:lvl4pPr marL="1371600" algn="l" defTabSz="914400" rtl="0" eaLnBrk="1" latinLnBrk="0" hangingPunct="1">
+      <a:defRPr sz="1200" kern="1200">
+        <a:solidFill>
+          <a:schemeClr val="tx1"/>
+        </a:solidFill>
+        <a:latin typeface="+mn-lt"/>
+        <a:ea typeface="+mn-ea"/>
+        <a:cs typeface="+mn-cs"/>
+      </a:defRPr>
+    </a:lvl4pPr>
+    <a:lvl5pPr marL="1828800" algn="l" defTabSz="914400" rtl="0" eaLnBrk="1" latinLnBrk="0" hangingPunct="1">
+      <a:defRPr sz="1200" kern="1200">
+        <a:solidFill>
+          <a:schemeClr val="tx1"/>
+        </a:solidFill>
+        <a:latin typeface="+mn-lt"/>
+        <a:ea typeface="+mn-ea"/>
+        <a:cs typeface="+mn-cs"/>
+      </a:defRPr>
+    </a:lvl5pPr>
+    <a:lvl6pPr marL="2286000" algn="l" defTabSz="914400" rtl="0" eaLnBrk="1" latinLnBrk="0" hangingPunct="1">
+      <a:defRPr sz="1200" kern="1200">
+        <a:solidFill>
+          <a:schemeClr val="tx1"/>
+        </a:solidFill>
+        <a:latin typeface="+mn-lt"/>
+        <a:ea typeface="+mn-ea"/>
+        <a:cs typeface="+mn-cs"/>
+      </a:defRPr>
+    </a:lvl6pPr>
+    <a:lvl7pPr marL="2743200" algn="l" defTabSz="914400" rtl="0" eaLnBrk="1" latinLnBrk="0" hangingPunct="1">
+      <a:defRPr sz="1200" kern="1200">
+        <a:solidFill>
+          <a:schemeClr val="tx1"/>
+        </a:solidFill>
+        <a:latin typeface="+mn-lt"/>
+        <a:ea typeface="+mn-ea"/>
+        <a:cs typeface="+mn-cs"/>
+      </a:defRPr>
+    </a:lvl7pPr>
+    <a:lvl8pPr marL="3200400" algn="l" defTabSz="914400" rtl="0" eaLnBrk="1" latinLnBrk="0" hangingPunct="1">
+      <a:defRPr sz="1200" kern="1200">
+        <a:solidFill>
+          <a:schemeClr val="tx1"/>
+        </a:solidFill>
+        <a:latin typeface="+mn-lt"/>
+        <a:ea typeface="+mn-ea"/>
+        <a:cs typeface="+mn-cs"/>
+      </a:defRPr>
+    </a:lvl8pPr>
+    <a:lvl9pPr marL="3657600" algn="l" defTabSz="914400" rtl="0" eaLnBrk="1" latinLnBrk="0" hangingPunct="1">
+      <a:defRPr sz="1200" kern="1200">
+        <a:solidFill>
+          <a:schemeClr val="tx1"/>
+        </a:solidFill>
+        <a:latin typeface="+mn-lt"/>
+        <a:ea typeface="+mn-ea"/>
+        <a:cs typeface="+mn-cs"/>
+      </a:defRPr>
+    </a:lvl9pPr>
+  </p:notesStyle>
+</p:notesMaster>
+</file>
+
+<file path=ppt/notesSlides/notesSlide1.xml><?xml version="1.0" encoding="utf-8"?>
+<p:notes xmlns:a="http://schemas.openxmlformats.org/drawingml/2006/main" xmlns:r="http://schemas.openxmlformats.org/officeDocument/2006/relationships" xmlns:p="http://schemas.openxmlformats.org/presentationml/2006/main">
+  <p:cSld>
+    <p:spTree>
+      <p:nvGrpSpPr>
+        <p:cNvPr id="1" name=""/>
+        <p:cNvGrpSpPr/>
+        <p:nvPr/>
+      </p:nvGrpSpPr>
+      <p:grpSpPr>
+        <a:xfrm>
+          <a:off x="0" y="0"/>
+          <a:ext cx="0" cy="0"/>
+          <a:chOff x="0" y="0"/>
+          <a:chExt cx="0" cy="0"/>
+        </a:xfrm>
+      </p:grpSpPr>
+      <p:sp>
+        <p:nvSpPr>
+          <p:cNvPr id="2" name="Slide Image Placeholder 1"/>
+          <p:cNvSpPr>
+            <a:spLocks noGrp="1" noRot="1" noChangeAspect="1"/>
+          </p:cNvSpPr>
+          <p:nvPr>
+            <p:ph type="sldImg"/>
+          </p:nvPr>
+        </p:nvSpPr>
+        <p:spPr/>
+      </p:sp>
+      <p:sp>
+        <p:nvSpPr>
+          <p:cNvPr id="3" name="Notes Placeholder 2"/>
+          <p:cNvSpPr>
+            <a:spLocks noGrp="1"/>
+          </p:cNvSpPr>
+          <p:nvPr>
+            <p:ph type="body" idx="1"/>
+          </p:nvPr>
+        </p:nvSpPr>
+        <p:spPr/>
+        <p:txBody>
+          <a:bodyPr/>
+          <a:lstStyle/>
+          <a:p>
+            <a:endParaRPr lang="en-GB" dirty="0"/>
+          </a:p>
+        </p:txBody>
+      </p:sp>
+      <p:sp>
+        <p:nvSpPr>
+          <p:cNvPr id="4" name="Slide Number Placeholder 3"/>
+          <p:cNvSpPr>
+            <a:spLocks noGrp="1"/>
+          </p:cNvSpPr>
+          <p:nvPr>
+            <p:ph type="sldNum" sz="quarter" idx="5"/>
+          </p:nvPr>
+        </p:nvSpPr>
+        <p:spPr/>
+        <p:txBody>
+          <a:bodyPr/>
+          <a:lstStyle/>
+          <a:p>
+            <a:fld id="{853201CA-7301-4E5C-8E75-BD85EDC7E966}" type="slidenum">
+              <a:rPr lang="en-GB" smtClean="0"/>
+              <a:t>1</a:t>
+            </a:fld>
+            <a:endParaRPr lang="en-GB"/>
+          </a:p>
+        </p:txBody>
+      </p:sp>
+    </p:spTree>
+    <p:extLst>
+      <p:ext uri="{BB962C8B-B14F-4D97-AF65-F5344CB8AC3E}">
+        <p14:creationId xmlns:p14="http://schemas.microsoft.com/office/powerpoint/2010/main" val="3609876320"/>
+      </p:ext>
+    </p:extLst>
+  </p:cSld>
+  <p:clrMapOvr>
+    <a:masterClrMapping/>
+  </p:clrMapOvr>
+</p:notes>
 </file>
 
 <file path=ppt/slideLayouts/slideLayout1.xml><?xml version="1.0" encoding="utf-8"?>
@@ -168,6 +855,7 @@
               <a:rPr lang="en-US"/>
               <a:t>Click to edit Master title style</a:t>
             </a:r>
+            <a:endParaRPr lang="en-US" dirty="0"/>
           </a:p>
         </p:txBody>
       </p:sp>
@@ -232,6 +920,7 @@
               <a:rPr lang="en-US"/>
               <a:t>Click to edit Master subtitle style</a:t>
             </a:r>
+            <a:endParaRPr lang="en-US" dirty="0"/>
           </a:p>
         </p:txBody>
       </p:sp>
@@ -252,7 +941,7 @@
           <a:p>
             <a:fld id="{4EA9AAC7-FE07-4F31-A079-BF52AC34DFF8}" type="datetimeFigureOut">
               <a:rPr lang="en-GB" smtClean="0"/>
-              <a:t>24/04/2025</a:t>
+              <a:t>27/06/2025</a:t>
             </a:fld>
             <a:endParaRPr lang="en-GB"/>
           </a:p>
@@ -349,6 +1038,7 @@
               <a:rPr lang="en-US"/>
               <a:t>Click to edit Master title style</a:t>
             </a:r>
+            <a:endParaRPr lang="en-US" dirty="0"/>
           </a:p>
         </p:txBody>
       </p:sp>
@@ -400,6 +1090,7 @@
               <a:rPr lang="en-US"/>
               <a:t>Fifth level</a:t>
             </a:r>
+            <a:endParaRPr lang="en-US" dirty="0"/>
           </a:p>
         </p:txBody>
       </p:sp>
@@ -420,7 +1111,7 @@
           <a:p>
             <a:fld id="{4EA9AAC7-FE07-4F31-A079-BF52AC34DFF8}" type="datetimeFigureOut">
               <a:rPr lang="en-GB" smtClean="0"/>
-              <a:t>24/04/2025</a:t>
+              <a:t>27/06/2025</a:t>
             </a:fld>
             <a:endParaRPr lang="en-GB"/>
           </a:p>
@@ -522,6 +1213,7 @@
               <a:rPr lang="en-US"/>
               <a:t>Click to edit Master title style</a:t>
             </a:r>
+            <a:endParaRPr lang="en-US" dirty="0"/>
           </a:p>
         </p:txBody>
       </p:sp>
@@ -578,6 +1270,7 @@
               <a:rPr lang="en-US"/>
               <a:t>Fifth level</a:t>
             </a:r>
+            <a:endParaRPr lang="en-US" dirty="0"/>
           </a:p>
         </p:txBody>
       </p:sp>
@@ -598,7 +1291,7 @@
           <a:p>
             <a:fld id="{4EA9AAC7-FE07-4F31-A079-BF52AC34DFF8}" type="datetimeFigureOut">
               <a:rPr lang="en-GB" smtClean="0"/>
-              <a:t>24/04/2025</a:t>
+              <a:t>27/06/2025</a:t>
             </a:fld>
             <a:endParaRPr lang="en-GB"/>
           </a:p>
@@ -695,6 +1388,7 @@
               <a:rPr lang="en-US"/>
               <a:t>Click to edit Master title style</a:t>
             </a:r>
+            <a:endParaRPr lang="en-US" dirty="0"/>
           </a:p>
         </p:txBody>
       </p:sp>
@@ -746,6 +1440,7 @@
               <a:rPr lang="en-US"/>
               <a:t>Fifth level</a:t>
             </a:r>
+            <a:endParaRPr lang="en-US" dirty="0"/>
           </a:p>
         </p:txBody>
       </p:sp>
@@ -766,7 +1461,7 @@
           <a:p>
             <a:fld id="{4EA9AAC7-FE07-4F31-A079-BF52AC34DFF8}" type="datetimeFigureOut">
               <a:rPr lang="en-GB" smtClean="0"/>
-              <a:t>24/04/2025</a:t>
+              <a:t>27/06/2025</a:t>
             </a:fld>
             <a:endParaRPr lang="en-GB"/>
           </a:p>
@@ -872,6 +1567,7 @@
               <a:rPr lang="en-US"/>
               <a:t>Click to edit Master title style</a:t>
             </a:r>
+            <a:endParaRPr lang="en-US" dirty="0"/>
           </a:p>
         </p:txBody>
       </p:sp>
@@ -1011,7 +1707,7 @@
           <a:p>
             <a:fld id="{4EA9AAC7-FE07-4F31-A079-BF52AC34DFF8}" type="datetimeFigureOut">
               <a:rPr lang="en-GB" smtClean="0"/>
-              <a:t>24/04/2025</a:t>
+              <a:t>27/06/2025</a:t>
             </a:fld>
             <a:endParaRPr lang="en-GB"/>
           </a:p>
@@ -1108,6 +1804,7 @@
               <a:rPr lang="en-US"/>
               <a:t>Click to edit Master title style</a:t>
             </a:r>
+            <a:endParaRPr lang="en-US" dirty="0"/>
           </a:p>
         </p:txBody>
       </p:sp>
@@ -1164,6 +1861,7 @@
               <a:rPr lang="en-US"/>
               <a:t>Fifth level</a:t>
             </a:r>
+            <a:endParaRPr lang="en-US" dirty="0"/>
           </a:p>
         </p:txBody>
       </p:sp>
@@ -1220,6 +1918,7 @@
               <a:rPr lang="en-US"/>
               <a:t>Fifth level</a:t>
             </a:r>
+            <a:endParaRPr lang="en-US" dirty="0"/>
           </a:p>
         </p:txBody>
       </p:sp>
@@ -1240,7 +1939,7 @@
           <a:p>
             <a:fld id="{4EA9AAC7-FE07-4F31-A079-BF52AC34DFF8}" type="datetimeFigureOut">
               <a:rPr lang="en-GB" smtClean="0"/>
-              <a:t>24/04/2025</a:t>
+              <a:t>27/06/2025</a:t>
             </a:fld>
             <a:endParaRPr lang="en-GB"/>
           </a:p>
@@ -1342,6 +2041,7 @@
               <a:rPr lang="en-US"/>
               <a:t>Click to edit Master title style</a:t>
             </a:r>
+            <a:endParaRPr lang="en-US" dirty="0"/>
           </a:p>
         </p:txBody>
       </p:sp>
@@ -1463,6 +2163,7 @@
               <a:rPr lang="en-US"/>
               <a:t>Fifth level</a:t>
             </a:r>
+            <a:endParaRPr lang="en-US" dirty="0"/>
           </a:p>
         </p:txBody>
       </p:sp>
@@ -1584,6 +2285,7 @@
               <a:rPr lang="en-US"/>
               <a:t>Fifth level</a:t>
             </a:r>
+            <a:endParaRPr lang="en-US" dirty="0"/>
           </a:p>
         </p:txBody>
       </p:sp>
@@ -1604,7 +2306,7 @@
           <a:p>
             <a:fld id="{4EA9AAC7-FE07-4F31-A079-BF52AC34DFF8}" type="datetimeFigureOut">
               <a:rPr lang="en-GB" smtClean="0"/>
-              <a:t>24/04/2025</a:t>
+              <a:t>27/06/2025</a:t>
             </a:fld>
             <a:endParaRPr lang="en-GB"/>
           </a:p>
@@ -1701,6 +2403,7 @@
               <a:rPr lang="en-US"/>
               <a:t>Click to edit Master title style</a:t>
             </a:r>
+            <a:endParaRPr lang="en-US" dirty="0"/>
           </a:p>
         </p:txBody>
       </p:sp>
@@ -1721,7 +2424,7 @@
           <a:p>
             <a:fld id="{4EA9AAC7-FE07-4F31-A079-BF52AC34DFF8}" type="datetimeFigureOut">
               <a:rPr lang="en-GB" smtClean="0"/>
-              <a:t>24/04/2025</a:t>
+              <a:t>27/06/2025</a:t>
             </a:fld>
             <a:endParaRPr lang="en-GB"/>
           </a:p>
@@ -1816,7 +2519,7 @@
           <a:p>
             <a:fld id="{4EA9AAC7-FE07-4F31-A079-BF52AC34DFF8}" type="datetimeFigureOut">
               <a:rPr lang="en-GB" smtClean="0"/>
-              <a:t>24/04/2025</a:t>
+              <a:t>27/06/2025</a:t>
             </a:fld>
             <a:endParaRPr lang="en-GB"/>
           </a:p>
@@ -1922,6 +2625,7 @@
               <a:rPr lang="en-US"/>
               <a:t>Click to edit Master title style</a:t>
             </a:r>
+            <a:endParaRPr lang="en-US" dirty="0"/>
           </a:p>
         </p:txBody>
       </p:sp>
@@ -2006,6 +2710,7 @@
               <a:rPr lang="en-US"/>
               <a:t>Fifth level</a:t>
             </a:r>
+            <a:endParaRPr lang="en-US" dirty="0"/>
           </a:p>
         </p:txBody>
       </p:sp>
@@ -2091,7 +2796,7 @@
           <a:p>
             <a:fld id="{4EA9AAC7-FE07-4F31-A079-BF52AC34DFF8}" type="datetimeFigureOut">
               <a:rPr lang="en-GB" smtClean="0"/>
-              <a:t>24/04/2025</a:t>
+              <a:t>27/06/2025</a:t>
             </a:fld>
             <a:endParaRPr lang="en-GB"/>
           </a:p>
@@ -2197,6 +2902,7 @@
               <a:rPr lang="en-US"/>
               <a:t>Click to edit Master title style</a:t>
             </a:r>
+            <a:endParaRPr lang="en-US" dirty="0"/>
           </a:p>
         </p:txBody>
       </p:sp>
@@ -2261,6 +2967,7 @@
               <a:rPr lang="en-US"/>
               <a:t>Click icon to add picture</a:t>
             </a:r>
+            <a:endParaRPr lang="en-US" dirty="0"/>
           </a:p>
         </p:txBody>
       </p:sp>
@@ -2346,7 +3053,7 @@
           <a:p>
             <a:fld id="{4EA9AAC7-FE07-4F31-A079-BF52AC34DFF8}" type="datetimeFigureOut">
               <a:rPr lang="en-GB" smtClean="0"/>
-              <a:t>24/04/2025</a:t>
+              <a:t>27/06/2025</a:t>
             </a:fld>
             <a:endParaRPr lang="en-GB"/>
           </a:p>
@@ -2458,6 +3165,7 @@
               <a:rPr lang="en-US"/>
               <a:t>Click to edit Master title style</a:t>
             </a:r>
+            <a:endParaRPr lang="en-US" dirty="0"/>
           </a:p>
         </p:txBody>
       </p:sp>
@@ -2519,6 +3227,7 @@
               <a:rPr lang="en-US"/>
               <a:t>Fifth level</a:t>
             </a:r>
+            <a:endParaRPr lang="en-US" dirty="0"/>
           </a:p>
         </p:txBody>
       </p:sp>
@@ -2557,7 +3266,7 @@
           <a:p>
             <a:fld id="{4EA9AAC7-FE07-4F31-A079-BF52AC34DFF8}" type="datetimeFigureOut">
               <a:rPr lang="en-GB" smtClean="0"/>
-              <a:t>24/04/2025</a:t>
+              <a:t>27/06/2025</a:t>
             </a:fld>
             <a:endParaRPr lang="en-GB"/>
           </a:p>
@@ -2962,36 +3671,6 @@
           <a:chExt cx="0" cy="0"/>
         </a:xfrm>
       </p:grpSpPr>
-      <p:pic>
-        <p:nvPicPr>
-          <p:cNvPr id="2" name="Picture 1">
-            <a:extLst>
-              <a:ext uri="{FF2B5EF4-FFF2-40B4-BE49-F238E27FC236}">
-                <a16:creationId xmlns:a16="http://schemas.microsoft.com/office/drawing/2014/main" id="{8B69DAB7-FD72-1DC2-22C0-83B39481BFF4}"/>
-              </a:ext>
-            </a:extLst>
-          </p:cNvPr>
-          <p:cNvPicPr>
-            <a:picLocks noChangeAspect="1"/>
-          </p:cNvPicPr>
-          <p:nvPr/>
-        </p:nvPicPr>
-        <p:blipFill>
-          <a:blip r:embed="rId2"/>
-          <a:stretch>
-            <a:fillRect/>
-          </a:stretch>
-        </p:blipFill>
-        <p:spPr>
-          <a:xfrm>
-            <a:off x="3761767" y="5439079"/>
-            <a:ext cx="1831233" cy="243800"/>
-          </a:xfrm>
-          <a:prstGeom prst="rect">
-            <a:avLst/>
-          </a:prstGeom>
-        </p:spPr>
-      </p:pic>
       <p:sp>
         <p:nvSpPr>
           <p:cNvPr id="5" name="Rectangle: Rounded Corners 4">
@@ -3041,7 +3720,7 @@
           <a:p>
             <a:pPr algn="ctr"/>
             <a:r>
-              <a:rPr lang="en-GB" sz="1200"/>
+              <a:rPr lang="en-GB" sz="1200" dirty="0"/>
               <a:t>Have you already copied the repository into a local directory? (i.e. your ‘Git’ folder in CancerStats1)</a:t>
             </a:r>
           </a:p>
@@ -3088,7 +3767,7 @@
           <a:p>
             <a:pPr algn="ctr"/>
             <a:r>
-              <a:rPr lang="en-GB" sz="1200"/>
+              <a:rPr lang="en-GB" sz="1200" dirty="0"/>
               <a:t>Copy the repository from Git using HTTPS or SSH URLs, setup new project in RStudio</a:t>
             </a:r>
           </a:p>
@@ -3135,7 +3814,7 @@
           <a:p>
             <a:pPr algn="ctr"/>
             <a:r>
-              <a:rPr lang="en-GB" sz="1200"/>
+              <a:rPr lang="en-GB" sz="1200" dirty="0"/>
               <a:t>Checkout the main branch and pull any changes </a:t>
             </a:r>
           </a:p>
@@ -3182,7 +3861,7 @@
           <a:p>
             <a:pPr algn="ctr"/>
             <a:r>
-              <a:rPr lang="en-GB" sz="1200"/>
+              <a:rPr lang="en-GB" sz="1200" dirty="0"/>
               <a:t>Create a new feature branch to do your piece of work on, include your initials and the purpose of the branch in the branch name</a:t>
             </a:r>
           </a:p>
@@ -3229,7 +3908,7 @@
           <a:p>
             <a:pPr algn="ctr"/>
             <a:r>
-              <a:rPr lang="en-GB" sz="1200"/>
+              <a:rPr lang="en-GB" sz="1200" dirty="0"/>
               <a:t>Carry out your work, making edits or writing new code, and commit and push changes as you go – remember to write descriptive commit messages!</a:t>
             </a:r>
           </a:p>
@@ -3276,7 +3955,7 @@
           <a:p>
             <a:pPr algn="ctr"/>
             <a:r>
-              <a:rPr lang="en-GB" sz="1200"/>
+              <a:rPr lang="en-GB" sz="1200" dirty="0"/>
               <a:t>Ready for your work to be reviewed? Create a Pull Request and assign a reviewer (hopefully someone with a bit of info on the project already)</a:t>
             </a:r>
           </a:p>
@@ -3323,15 +4002,15 @@
           <a:p>
             <a:pPr algn="ctr"/>
             <a:r>
-              <a:rPr lang="en-GB" sz="1200"/>
+              <a:rPr lang="en-GB" sz="1200" dirty="0"/>
               <a:t>Reviewer looks over the changes on GitHub/</a:t>
             </a:r>
             <a:r>
-              <a:rPr lang="en-GB" sz="1200" err="1"/>
+              <a:rPr lang="en-GB" sz="1200" dirty="0" err="1"/>
               <a:t>Gitea</a:t>
             </a:r>
             <a:r>
-              <a:rPr lang="en-GB" sz="1200"/>
+              <a:rPr lang="en-GB" sz="1200" dirty="0"/>
               <a:t>, then runs the code in RStudio to ensure it still works in practice</a:t>
             </a:r>
           </a:p>
@@ -3378,7 +4057,7 @@
           <a:p>
             <a:pPr algn="ctr"/>
             <a:r>
-              <a:rPr lang="en-GB" sz="1200"/>
+              <a:rPr lang="en-GB" sz="1200" dirty="0"/>
               <a:t>Reviewer submits review, either requesting changes or giving approval</a:t>
             </a:r>
           </a:p>
@@ -3425,7 +4104,7 @@
           <a:p>
             <a:pPr algn="ctr"/>
             <a:r>
-              <a:rPr lang="en-GB" sz="1200"/>
+              <a:rPr lang="en-GB" sz="1200" dirty="0"/>
               <a:t>Once approved, reviewer merges the feature branch with the main branch, and delete the feature branch</a:t>
             </a:r>
           </a:p>
@@ -3472,7 +4151,7 @@
           <a:p>
             <a:pPr algn="ctr"/>
             <a:r>
-              <a:rPr lang="en-GB" sz="1200"/>
+              <a:rPr lang="en-GB" sz="1200" dirty="0"/>
               <a:t>Once your branch has been merged, checkout the main branch and pull changes to update your local version</a:t>
             </a:r>
           </a:p>
@@ -3519,7 +4198,7 @@
           <a:p>
             <a:pPr algn="ctr"/>
             <a:r>
-              <a:rPr lang="en-GB" sz="1200"/>
+              <a:rPr lang="en-GB" sz="1200" dirty="0"/>
               <a:t>Assign a tag to the merge commit and push the tag </a:t>
             </a:r>
           </a:p>
@@ -3566,7 +4245,7 @@
           <a:p>
             <a:pPr algn="ctr"/>
             <a:r>
-              <a:rPr lang="en-GB" sz="1200"/>
+              <a:rPr lang="en-GB" sz="1200" dirty="0"/>
               <a:t>Delete old branches in RStudio to ensure you don’t accidentally keep working on them locally</a:t>
             </a:r>
           </a:p>
@@ -3618,7 +4297,7 @@
           <a:p>
             <a:pPr algn="ctr"/>
             <a:r>
-              <a:rPr lang="en-GB" sz="2400" b="1"/>
+              <a:rPr lang="en-GB" sz="2400" b="1" dirty="0"/>
               <a:t>Git workflow with RStudio</a:t>
             </a:r>
           </a:p>
@@ -3673,7 +4352,7 @@
           <a:p>
             <a:pPr algn="ctr"/>
             <a:r>
-              <a:rPr lang="en-GB" b="1"/>
+              <a:rPr lang="en-GB" b="1" dirty="0"/>
               <a:t>AUTHOR</a:t>
             </a:r>
           </a:p>
@@ -3728,7 +4407,7 @@
           <a:p>
             <a:pPr algn="ctr"/>
             <a:r>
-              <a:rPr lang="en-GB" b="1"/>
+              <a:rPr lang="en-GB" b="1" dirty="0"/>
               <a:t>AUTHOR</a:t>
             </a:r>
           </a:p>
@@ -3783,7 +4462,7 @@
           <a:p>
             <a:pPr algn="ctr"/>
             <a:r>
-              <a:rPr lang="en-GB" b="1"/>
+              <a:rPr lang="en-GB" b="1" dirty="0"/>
               <a:t>REVIEWER</a:t>
             </a:r>
           </a:p>
@@ -3838,7 +4517,7 @@
           <a:p>
             <a:pPr algn="ctr"/>
             <a:r>
-              <a:rPr lang="en-GB" sz="1200"/>
+              <a:rPr lang="en-GB" sz="1200" dirty="0"/>
               <a:t>Is this a main version of the code? i.e. used to produce annual publication, or bi-annual KPIs</a:t>
             </a:r>
           </a:p>
@@ -4399,13 +5078,13 @@
           <a:lstStyle/>
           <a:p>
             <a:r>
-              <a:rPr lang="en-GB" sz="1200"/>
+              <a:rPr lang="en-GB" sz="1200" dirty="0"/>
               <a:t>$ git checkout main</a:t>
             </a:r>
           </a:p>
           <a:p>
             <a:r>
-              <a:rPr lang="en-GB" sz="1200"/>
+              <a:rPr lang="en-GB" sz="1200" dirty="0"/>
               <a:t>$ git pull</a:t>
             </a:r>
           </a:p>
@@ -4425,8 +5104,8 @@
         </p:nvSpPr>
         <p:spPr>
           <a:xfrm>
-            <a:off x="3248447" y="3051706"/>
-            <a:ext cx="3835419" cy="461665"/>
+            <a:off x="3297085" y="3100344"/>
+            <a:ext cx="2862654" cy="461665"/>
           </a:xfrm>
           <a:prstGeom prst="rect">
             <a:avLst/>
@@ -4434,51 +5113,37 @@
           <a:noFill/>
         </p:spPr>
         <p:txBody>
-          <a:bodyPr wrap="square" lIns="91440" tIns="45720" rIns="91440" bIns="45720" rtlCol="0" anchor="t">
+          <a:bodyPr wrap="square" rtlCol="0">
             <a:spAutoFit/>
           </a:bodyPr>
           <a:lstStyle/>
           <a:p>
             <a:r>
-              <a:rPr lang="en-GB" sz="1200"/>
+              <a:rPr lang="en-GB" sz="1200" dirty="0"/>
               <a:t>$ git checkout –b &lt;</a:t>
             </a:r>
             <a:r>
-              <a:rPr lang="en-GB" sz="1200" err="1"/>
+              <a:rPr lang="en-GB" sz="1200" dirty="0" err="1"/>
               <a:t>new_branch_name</a:t>
             </a:r>
             <a:r>
-              <a:rPr lang="en-GB" sz="1200"/>
+              <a:rPr lang="en-GB" sz="1200" dirty="0"/>
               <a:t>&gt;</a:t>
             </a:r>
           </a:p>
           <a:p>
             <a:r>
-              <a:rPr lang="en-GB" sz="1200"/>
-              <a:t>$</a:t>
-            </a:r>
-            <a:r>
-              <a:rPr lang="en-GB" sz="1200">
-                <a:ea typeface="+mn-lt"/>
-                <a:cs typeface="+mn-lt"/>
-              </a:rPr>
-              <a:t> git push --set-upstream origin &lt;</a:t>
-            </a:r>
-            <a:r>
-              <a:rPr lang="en-GB" sz="1200" err="1">
-                <a:ea typeface="+mn-lt"/>
-                <a:cs typeface="+mn-lt"/>
-              </a:rPr>
+              <a:rPr lang="en-GB" sz="1200" dirty="0"/>
+              <a:t>$ git push origin &lt;</a:t>
+            </a:r>
+            <a:r>
+              <a:rPr lang="en-GB" sz="1200" dirty="0" err="1"/>
               <a:t>new_branch_name</a:t>
             </a:r>
             <a:r>
-              <a:rPr lang="en-GB" sz="1200">
-                <a:ea typeface="+mn-lt"/>
-                <a:cs typeface="+mn-lt"/>
-              </a:rPr>
+              <a:rPr lang="en-GB" sz="1200" dirty="0"/>
               <a:t>&gt;</a:t>
             </a:r>
-            <a:endParaRPr lang="en-GB" sz="1200"/>
           </a:p>
         </p:txBody>
       </p:sp>
@@ -4497,7 +5162,7 @@
         <p:spPr>
           <a:xfrm>
             <a:off x="3297085" y="4212247"/>
-            <a:ext cx="2862654" cy="830997"/>
+            <a:ext cx="2862654" cy="646331"/>
           </a:xfrm>
           <a:prstGeom prst="rect">
             <a:avLst/>
@@ -4505,39 +5170,33 @@
           <a:noFill/>
         </p:spPr>
         <p:txBody>
-          <a:bodyPr wrap="square" lIns="91440" tIns="45720" rIns="91440" bIns="45720" rtlCol="0" anchor="t">
+          <a:bodyPr wrap="square" rtlCol="0">
             <a:spAutoFit/>
           </a:bodyPr>
           <a:lstStyle/>
           <a:p>
             <a:r>
-              <a:rPr lang="en-GB" sz="1200"/>
+              <a:rPr lang="en-GB" sz="1200" dirty="0"/>
               <a:t>$ git add &lt;</a:t>
             </a:r>
             <a:r>
-              <a:rPr lang="en-GB" sz="1200" err="1"/>
+              <a:rPr lang="en-GB" sz="1200" dirty="0" err="1"/>
               <a:t>file_name</a:t>
             </a:r>
             <a:r>
-              <a:rPr lang="en-GB" sz="1200"/>
+              <a:rPr lang="en-GB" sz="1200" dirty="0"/>
               <a:t>&gt; </a:t>
             </a:r>
           </a:p>
           <a:p>
             <a:r>
-              <a:rPr lang="en-GB" sz="1200"/>
+              <a:rPr lang="en-GB" sz="1200" dirty="0"/>
               <a:t>$ git add . (-to add all files changed)</a:t>
             </a:r>
           </a:p>
           <a:p>
             <a:r>
-              <a:rPr lang="en-GB" sz="1200"/>
-              <a:t>$ git commit –m "&lt;detailed message&gt;"</a:t>
-            </a:r>
-          </a:p>
-          <a:p>
-            <a:r>
-              <a:rPr lang="en-GB" sz="1200"/>
+              <a:rPr lang="en-GB" sz="1200" dirty="0"/>
               <a:t>$ git push</a:t>
             </a:r>
           </a:p>
@@ -4601,7 +5260,7 @@
           <a:lstStyle/>
           <a:p>
             <a:r>
-              <a:rPr lang="en-GB" sz="1200"/>
+              <a:rPr lang="en-GB" sz="1200" dirty="0"/>
               <a:t>Pull requests tab &gt;</a:t>
             </a:r>
           </a:p>
@@ -4636,12 +5295,41 @@
           <a:lstStyle/>
           <a:p>
             <a:r>
-              <a:rPr lang="en-GB" sz="1200"/>
+              <a:rPr lang="en-GB" sz="1200" dirty="0"/>
               <a:t>&gt;</a:t>
             </a:r>
           </a:p>
         </p:txBody>
       </p:sp>
+      <p:pic>
+        <p:nvPicPr>
+          <p:cNvPr id="50" name="Picture 49">
+            <a:extLst>
+              <a:ext uri="{FF2B5EF4-FFF2-40B4-BE49-F238E27FC236}">
+                <a16:creationId xmlns:a16="http://schemas.microsoft.com/office/drawing/2014/main" id="{58E60E69-13C7-DE61-0D3F-E0D52A17CD2F}"/>
+              </a:ext>
+            </a:extLst>
+          </p:cNvPr>
+          <p:cNvPicPr>
+            <a:picLocks noChangeAspect="1"/>
+          </p:cNvPicPr>
+          <p:nvPr/>
+        </p:nvPicPr>
+        <p:blipFill>
+          <a:blip r:embed="rId6"/>
+          <a:srcRect t="19922" b="12900"/>
+          <a:stretch/>
+        </p:blipFill>
+        <p:spPr>
+          <a:xfrm>
+            <a:off x="3761371" y="5458028"/>
+            <a:ext cx="1704975" cy="286342"/>
+          </a:xfrm>
+          <a:prstGeom prst="rect">
+            <a:avLst/>
+          </a:prstGeom>
+        </p:spPr>
+      </p:pic>
       <p:sp>
         <p:nvSpPr>
           <p:cNvPr id="51" name="Rectangle 50">
@@ -4656,8 +5344,8 @@
         </p:nvSpPr>
         <p:spPr>
           <a:xfrm>
-            <a:off x="5295848" y="5417171"/>
-            <a:ext cx="315565" cy="252467"/>
+            <a:off x="5263423" y="5433383"/>
+            <a:ext cx="185861" cy="155191"/>
           </a:xfrm>
           <a:prstGeom prst="rect">
             <a:avLst/>
@@ -4736,7 +5424,7 @@
           <a:lstStyle/>
           <a:p>
             <a:pPr algn="ctr"/>
-            <a:endParaRPr lang="en-GB"/>
+            <a:endParaRPr lang="en-GB" dirty="0"/>
           </a:p>
         </p:txBody>
       </p:sp>
@@ -5150,7 +5838,7 @@
           <a:lstStyle/>
           <a:p>
             <a:pPr algn="ctr"/>
-            <a:endParaRPr lang="en-GB"/>
+            <a:endParaRPr lang="en-GB" dirty="0"/>
           </a:p>
         </p:txBody>
       </p:sp>
@@ -5296,7 +5984,7 @@
           <a:lstStyle/>
           <a:p>
             <a:pPr algn="ctr"/>
-            <a:endParaRPr lang="en-GB"/>
+            <a:endParaRPr lang="en-GB" dirty="0"/>
           </a:p>
         </p:txBody>
       </p:sp>
@@ -5342,7 +6030,7 @@
           <a:lstStyle/>
           <a:p>
             <a:pPr algn="ctr"/>
-            <a:endParaRPr lang="en-GB" b="1"/>
+            <a:endParaRPr lang="en-GB" b="1" dirty="0"/>
           </a:p>
         </p:txBody>
       </p:sp>
@@ -5375,21 +6063,21 @@
           <a:lstStyle/>
           <a:p>
             <a:r>
-              <a:rPr lang="en-GB" sz="1200"/>
+              <a:rPr lang="en-GB" sz="1200" dirty="0"/>
               <a:t>$ git remote prune origin</a:t>
             </a:r>
           </a:p>
           <a:p>
             <a:r>
-              <a:rPr lang="en-GB" sz="1200"/>
+              <a:rPr lang="en-GB" sz="1200" dirty="0"/>
               <a:t>$ git branch –d &lt;</a:t>
             </a:r>
             <a:r>
-              <a:rPr lang="en-GB" sz="1200" err="1"/>
+              <a:rPr lang="en-GB" sz="1200" dirty="0" err="1"/>
               <a:t>branch_name</a:t>
             </a:r>
             <a:r>
-              <a:rPr lang="en-GB" sz="1200"/>
+              <a:rPr lang="en-GB" sz="1200" dirty="0"/>
               <a:t>&gt;</a:t>
             </a:r>
           </a:p>
@@ -5424,29 +6112,29 @@
           <a:lstStyle/>
           <a:p>
             <a:r>
-              <a:rPr lang="en-GB" sz="1200"/>
+              <a:rPr lang="en-GB" sz="1200" dirty="0"/>
               <a:t>$ git tag –a &lt;</a:t>
             </a:r>
             <a:r>
-              <a:rPr lang="en-GB" sz="1200" err="1"/>
+              <a:rPr lang="en-GB" sz="1200" dirty="0" err="1"/>
               <a:t>tag_name</a:t>
             </a:r>
             <a:r>
-              <a:rPr lang="en-GB" sz="1200"/>
+              <a:rPr lang="en-GB" sz="1200" dirty="0"/>
               <a:t>&gt; -m “&lt;message&gt;”</a:t>
             </a:r>
           </a:p>
           <a:p>
             <a:r>
-              <a:rPr lang="en-GB" sz="1200"/>
+              <a:rPr lang="en-GB" sz="1200" dirty="0"/>
               <a:t>$ git push origin &lt;</a:t>
             </a:r>
             <a:r>
-              <a:rPr lang="en-GB" sz="1200" err="1"/>
+              <a:rPr lang="en-GB" sz="1200" dirty="0" err="1"/>
               <a:t>tag_name</a:t>
             </a:r>
             <a:r>
-              <a:rPr lang="en-GB" sz="1200"/>
+              <a:rPr lang="en-GB" sz="1200" dirty="0"/>
               <a:t>&gt;</a:t>
             </a:r>
           </a:p>
@@ -5533,12 +6221,12 @@
           <a:lstStyle/>
           <a:p>
             <a:r>
-              <a:rPr lang="en-GB" sz="1200">
-                <a:hlinkClick r:id="rId6"/>
+              <a:rPr lang="en-GB" sz="1200" dirty="0">
+                <a:hlinkClick r:id="rId7"/>
               </a:rPr>
               <a:t>Git commands</a:t>
             </a:r>
-            <a:endParaRPr lang="en-GB" sz="1200"/>
+            <a:endParaRPr lang="en-GB" sz="1200" dirty="0"/>
           </a:p>
         </p:txBody>
       </p:sp>
@@ -5571,12 +6259,12 @@
           <a:lstStyle/>
           <a:p>
             <a:r>
-              <a:rPr lang="en-GB" sz="1200">
-                <a:hlinkClick r:id="rId7"/>
+              <a:rPr lang="en-GB" sz="1200" dirty="0">
+                <a:hlinkClick r:id="rId8"/>
               </a:rPr>
               <a:t>Git setup</a:t>
             </a:r>
-            <a:endParaRPr lang="en-GB" sz="1200"/>
+            <a:endParaRPr lang="en-GB" sz="1200" dirty="0"/>
           </a:p>
         </p:txBody>
       </p:sp>
@@ -5609,12 +6297,51 @@
           <a:lstStyle/>
           <a:p>
             <a:r>
-              <a:rPr lang="en-GB" sz="1200">
-                <a:hlinkClick r:id="rId8"/>
+              <a:rPr lang="en-GB" sz="1200" dirty="0">
+                <a:hlinkClick r:id="rId9"/>
               </a:rPr>
               <a:t>Git copying repositories</a:t>
             </a:r>
-            <a:endParaRPr lang="en-GB" sz="1200"/>
+            <a:endParaRPr lang="en-GB" sz="1200" dirty="0"/>
+          </a:p>
+        </p:txBody>
+      </p:sp>
+      <p:sp>
+        <p:nvSpPr>
+          <p:cNvPr id="2" name="TextBox 1">
+            <a:extLst>
+              <a:ext uri="{FF2B5EF4-FFF2-40B4-BE49-F238E27FC236}">
+                <a16:creationId xmlns:a16="http://schemas.microsoft.com/office/drawing/2014/main" id="{A0F4870F-B95F-C299-804E-32BC8FF36DE3}"/>
+              </a:ext>
+            </a:extLst>
+          </p:cNvPr>
+          <p:cNvSpPr txBox="1"/>
+          <p:nvPr/>
+        </p:nvSpPr>
+        <p:spPr>
+          <a:xfrm>
+            <a:off x="5789684" y="262088"/>
+            <a:ext cx="1154040" cy="261610"/>
+          </a:xfrm>
+          <a:prstGeom prst="rect">
+            <a:avLst/>
+          </a:prstGeom>
+          <a:noFill/>
+        </p:spPr>
+        <p:txBody>
+          <a:bodyPr wrap="square" rtlCol="0">
+            <a:spAutoFit/>
+          </a:bodyPr>
+          <a:lstStyle/>
+          <a:p>
+            <a:r>
+              <a:rPr lang="en-GB" sz="1100" dirty="0">
+                <a:solidFill>
+                  <a:schemeClr val="bg1"/>
+                </a:solidFill>
+              </a:rPr>
+              <a:t>Aoife McCarthy</a:t>
+            </a:r>
           </a:p>
         </p:txBody>
       </p:sp>
@@ -5946,284 +6673,319 @@
 </a:theme>
 </file>
 
-<file path=customXml/item1.xml><?xml version="1.0" encoding="utf-8"?>
-<p:properties xmlns:p="http://schemas.microsoft.com/office/2006/metadata/properties" xmlns:xsi="http://www.w3.org/2001/XMLSchema-instance" xmlns:pc="http://schemas.microsoft.com/office/infopath/2007/PartnerControls">
-  <documentManagement>
-    <TaxCatchAll xmlns="81a4fd39-960a-47fc-bbd5-acd63bf991a7" xsi:nil="true"/>
-    <Programme xmlns="5cfd1834-9e95-4f60-8a5f-cd1a498d9d27" xsi:nil="true"/>
-    <lcf76f155ced4ddcb4097134ff3c332f xmlns="5cfd1834-9e95-4f60-8a5f-cd1a498d9d27">
-      <Terms xmlns="http://schemas.microsoft.com/office/infopath/2007/PartnerControls"/>
-    </lcf76f155ced4ddcb4097134ff3c332f>
-  </documentManagement>
-</p:properties>
-</file>
-
-<file path=customXml/item2.xml><?xml version="1.0" encoding="utf-8"?>
-<?mso-contentType ?>
-<FormTemplates xmlns="http://schemas.microsoft.com/sharepoint/v3/contenttype/forms">
-  <Display>DocumentLibraryForm</Display>
-  <Edit>DocumentLibraryForm</Edit>
-  <New>DocumentLibraryForm</New>
-</FormTemplates>
-</file>
-
-<file path=customXml/item3.xml><?xml version="1.0" encoding="utf-8"?>
-<ct:contentTypeSchema xmlns:ct="http://schemas.microsoft.com/office/2006/metadata/contentType" xmlns:ma="http://schemas.microsoft.com/office/2006/metadata/properties/metaAttributes" ct:_="" ma:_="" ma:contentTypeName="Document" ma:contentTypeID="0x010100D76821AB7EC5E14C9E3828143A074129" ma:contentTypeVersion="16" ma:contentTypeDescription="Create a new document." ma:contentTypeScope="" ma:versionID="7e8ee5af5426e4d43b5c45c3610fd6b2">
-  <xsd:schema xmlns:xsd="http://www.w3.org/2001/XMLSchema" xmlns:xs="http://www.w3.org/2001/XMLSchema" xmlns:p="http://schemas.microsoft.com/office/2006/metadata/properties" xmlns:ns2="5cfd1834-9e95-4f60-8a5f-cd1a498d9d27" xmlns:ns3="81a4fd39-960a-47fc-bbd5-acd63bf991a7" targetNamespace="http://schemas.microsoft.com/office/2006/metadata/properties" ma:root="true" ma:fieldsID="13418be2fd3c396e83ecfe98351854fd" ns2:_="" ns3:_="">
-    <xsd:import namespace="5cfd1834-9e95-4f60-8a5f-cd1a498d9d27"/>
-    <xsd:import namespace="81a4fd39-960a-47fc-bbd5-acd63bf991a7"/>
-    <xsd:element name="properties">
-      <xsd:complexType>
-        <xsd:sequence>
-          <xsd:element name="documentManagement">
-            <xsd:complexType>
-              <xsd:all>
-                <xsd:element ref="ns2:MediaServiceMetadata" minOccurs="0"/>
-                <xsd:element ref="ns2:MediaServiceFastMetadata" minOccurs="0"/>
-                <xsd:element ref="ns3:TaxCatchAll" minOccurs="0"/>
-                <xsd:element ref="ns2:MediaServiceDateTaken" minOccurs="0"/>
-                <xsd:element ref="ns2:MediaServiceLocation" minOccurs="0"/>
-                <xsd:element ref="ns2:MediaServiceGenerationTime" minOccurs="0"/>
-                <xsd:element ref="ns2:MediaServiceEventHashCode" minOccurs="0"/>
-                <xsd:element ref="ns2:lcf76f155ced4ddcb4097134ff3c332f" minOccurs="0"/>
-                <xsd:element ref="ns2:MediaServiceOCR" minOccurs="0"/>
-                <xsd:element ref="ns2:MediaLengthInSeconds" minOccurs="0"/>
-                <xsd:element ref="ns2:MediaServiceObjectDetectorVersions" minOccurs="0"/>
-                <xsd:element ref="ns2:MediaServiceSearchProperties" minOccurs="0"/>
-                <xsd:element ref="ns2:Programme" minOccurs="0"/>
-              </xsd:all>
-            </xsd:complexType>
-          </xsd:element>
-        </xsd:sequence>
-      </xsd:complexType>
-    </xsd:element>
-  </xsd:schema>
-  <xsd:schema xmlns:xsd="http://www.w3.org/2001/XMLSchema" xmlns:xs="http://www.w3.org/2001/XMLSchema" xmlns:dms="http://schemas.microsoft.com/office/2006/documentManagement/types" xmlns:pc="http://schemas.microsoft.com/office/infopath/2007/PartnerControls" targetNamespace="5cfd1834-9e95-4f60-8a5f-cd1a498d9d27" elementFormDefault="qualified">
-    <xsd:import namespace="http://schemas.microsoft.com/office/2006/documentManagement/types"/>
-    <xsd:import namespace="http://schemas.microsoft.com/office/infopath/2007/PartnerControls"/>
-    <xsd:element name="MediaServiceMetadata" ma:index="8" nillable="true" ma:displayName="MediaServiceMetadata" ma:hidden="true" ma:internalName="MediaServiceMetadata" ma:readOnly="true">
-      <xsd:simpleType>
-        <xsd:restriction base="dms:Note"/>
-      </xsd:simpleType>
-    </xsd:element>
-    <xsd:element name="MediaServiceFastMetadata" ma:index="9" nillable="true" ma:displayName="MediaServiceFastMetadata" ma:hidden="true" ma:internalName="MediaServiceFastMetadata" ma:readOnly="true">
-      <xsd:simpleType>
-        <xsd:restriction base="dms:Note"/>
-      </xsd:simpleType>
-    </xsd:element>
-    <xsd:element name="MediaServiceDateTaken" ma:index="11" nillable="true" ma:displayName="MediaServiceDateTaken" ma:hidden="true" ma:internalName="MediaServiceDateTaken" ma:readOnly="true">
-      <xsd:simpleType>
-        <xsd:restriction base="dms:Text"/>
-      </xsd:simpleType>
-    </xsd:element>
-    <xsd:element name="MediaServiceLocation" ma:index="12" nillable="true" ma:displayName="Location" ma:internalName="MediaServiceLocation" ma:readOnly="true">
-      <xsd:simpleType>
-        <xsd:restriction base="dms:Text"/>
-      </xsd:simpleType>
-    </xsd:element>
-    <xsd:element name="MediaServiceGenerationTime" ma:index="13" nillable="true" ma:displayName="MediaServiceGenerationTime" ma:hidden="true" ma:internalName="MediaServiceGenerationTime" ma:readOnly="true">
-      <xsd:simpleType>
-        <xsd:restriction base="dms:Text"/>
-      </xsd:simpleType>
-    </xsd:element>
-    <xsd:element name="MediaServiceEventHashCode" ma:index="14" nillable="true" ma:displayName="MediaServiceEventHashCode" ma:hidden="true" ma:internalName="MediaServiceEventHashCode" ma:readOnly="true">
-      <xsd:simpleType>
-        <xsd:restriction base="dms:Text"/>
-      </xsd:simpleType>
-    </xsd:element>
-    <xsd:element name="lcf76f155ced4ddcb4097134ff3c332f" ma:index="16" nillable="true" ma:taxonomy="true" ma:internalName="lcf76f155ced4ddcb4097134ff3c332f" ma:taxonomyFieldName="MediaServiceImageTags" ma:displayName="Image Tags" ma:readOnly="false" ma:fieldId="{5cf76f15-5ced-4ddc-b409-7134ff3c332f}" ma:taxonomyMulti="true" ma:sspId="16ac32b6-d060-42fb-93c0-6c46742e1aee" ma:termSetId="09814cd3-568e-fe90-9814-8d621ff8fb84" ma:anchorId="fba54fb3-c3e1-fe81-a776-ca4b69148c4d" ma:open="true" ma:isKeyword="false">
-      <xsd:complexType>
-        <xsd:sequence>
-          <xsd:element ref="pc:Terms" minOccurs="0" maxOccurs="1"/>
-        </xsd:sequence>
-      </xsd:complexType>
-    </xsd:element>
-    <xsd:element name="MediaServiceOCR" ma:index="17" nillable="true" ma:displayName="Extracted Text" ma:internalName="MediaServiceOCR" ma:readOnly="true">
-      <xsd:simpleType>
-        <xsd:restriction base="dms:Note">
-          <xsd:maxLength value="255"/>
-        </xsd:restriction>
-      </xsd:simpleType>
-    </xsd:element>
-    <xsd:element name="MediaLengthInSeconds" ma:index="18" nillable="true" ma:displayName="MediaLengthInSeconds" ma:hidden="true" ma:internalName="MediaLengthInSeconds" ma:readOnly="true">
-      <xsd:simpleType>
-        <xsd:restriction base="dms:Unknown"/>
-      </xsd:simpleType>
-    </xsd:element>
-    <xsd:element name="MediaServiceObjectDetectorVersions" ma:index="19" nillable="true" ma:displayName="MediaServiceObjectDetectorVersions" ma:hidden="true" ma:indexed="true" ma:internalName="MediaServiceObjectDetectorVersions" ma:readOnly="true">
-      <xsd:simpleType>
-        <xsd:restriction base="dms:Text"/>
-      </xsd:simpleType>
-    </xsd:element>
-    <xsd:element name="MediaServiceSearchProperties" ma:index="20" nillable="true" ma:displayName="MediaServiceSearchProperties" ma:hidden="true" ma:internalName="MediaServiceSearchProperties" ma:readOnly="true">
-      <xsd:simpleType>
-        <xsd:restriction base="dms:Note"/>
-      </xsd:simpleType>
-    </xsd:element>
-    <xsd:element name="Programme" ma:index="21" nillable="true" ma:displayName="Programme" ma:format="Dropdown" ma:internalName="Programme">
-      <xsd:simpleType>
-        <xsd:restriction base="dms:Choice">
-          <xsd:enumeration value="AAA"/>
-          <xsd:enumeration value="Bowel"/>
-          <xsd:enumeration value="Breast"/>
-          <xsd:enumeration value="Cervical"/>
-          <xsd:enumeration value="Lung"/>
-          <xsd:enumeration value="DES"/>
-          <xsd:enumeration value="All Programmes"/>
-        </xsd:restriction>
-      </xsd:simpleType>
-    </xsd:element>
-  </xsd:schema>
-  <xsd:schema xmlns:xsd="http://www.w3.org/2001/XMLSchema" xmlns:xs="http://www.w3.org/2001/XMLSchema" xmlns:dms="http://schemas.microsoft.com/office/2006/documentManagement/types" xmlns:pc="http://schemas.microsoft.com/office/infopath/2007/PartnerControls" targetNamespace="81a4fd39-960a-47fc-bbd5-acd63bf991a7" elementFormDefault="qualified">
-    <xsd:import namespace="http://schemas.microsoft.com/office/2006/documentManagement/types"/>
-    <xsd:import namespace="http://schemas.microsoft.com/office/infopath/2007/PartnerControls"/>
-    <xsd:element name="TaxCatchAll" ma:index="10" nillable="true" ma:displayName="Taxonomy Catch All Column" ma:hidden="true" ma:list="{db31d38e-54dc-411a-ae33-a059b514f2ad}" ma:internalName="TaxCatchAll" ma:showField="CatchAllData" ma:web="81a4fd39-960a-47fc-bbd5-acd63bf991a7">
-      <xsd:complexType>
-        <xsd:complexContent>
-          <xsd:extension base="dms:MultiChoiceLookup">
-            <xsd:sequence>
-              <xsd:element name="Value" type="dms:Lookup" maxOccurs="unbounded" minOccurs="0" nillable="true"/>
-            </xsd:sequence>
-          </xsd:extension>
-        </xsd:complexContent>
-      </xsd:complexType>
-    </xsd:element>
-  </xsd:schema>
-  <xsd:schema xmlns="http://schemas.openxmlformats.org/package/2006/metadata/core-properties" xmlns:xsd="http://www.w3.org/2001/XMLSchema" xmlns:xsi="http://www.w3.org/2001/XMLSchema-instance" xmlns:dc="http://purl.org/dc/elements/1.1/" xmlns:dcterms="http://purl.org/dc/terms/" xmlns:odoc="http://schemas.microsoft.com/internal/obd" targetNamespace="http://schemas.openxmlformats.org/package/2006/metadata/core-properties" elementFormDefault="qualified" attributeFormDefault="unqualified" blockDefault="#all">
-    <xsd:import namespace="http://purl.org/dc/elements/1.1/" schemaLocation="http://dublincore.org/schemas/xmls/qdc/2003/04/02/dc.xsd"/>
-    <xsd:import namespace="http://purl.org/dc/terms/" schemaLocation="http://dublincore.org/schemas/xmls/qdc/2003/04/02/dcterms.xsd"/>
-    <xsd:element name="coreProperties" type="CT_coreProperties"/>
-    <xsd:complexType name="CT_coreProperties">
-      <xsd:all>
-        <xsd:element ref="dc:creator" minOccurs="0" maxOccurs="1"/>
-        <xsd:element ref="dcterms:created" minOccurs="0" maxOccurs="1"/>
-        <xsd:element ref="dc:identifier" minOccurs="0" maxOccurs="1"/>
-        <xsd:element name="contentType" minOccurs="0" maxOccurs="1" type="xsd:string" ma:index="0" ma:displayName="Content Type"/>
-        <xsd:element ref="dc:title" minOccurs="0" maxOccurs="1" ma:index="4" ma:displayName="Title"/>
-        <xsd:element ref="dc:subject" minOccurs="0" maxOccurs="1"/>
-        <xsd:element ref="dc:description" minOccurs="0" maxOccurs="1"/>
-        <xsd:element name="keywords" minOccurs="0" maxOccurs="1" type="xsd:string"/>
-        <xsd:element ref="dc:language" minOccurs="0" maxOccurs="1"/>
-        <xsd:element name="category" minOccurs="0" maxOccurs="1" type="xsd:string"/>
-        <xsd:element name="version" minOccurs="0" maxOccurs="1" type="xsd:string"/>
-        <xsd:element name="revision" minOccurs="0" maxOccurs="1" type="xsd:string">
-          <xsd:annotation>
-            <xsd:documentation>
-                        This value indicates the number of saves or revisions. The application is responsible for updating this value after each revision.
-                    </xsd:documentation>
-          </xsd:annotation>
-        </xsd:element>
-        <xsd:element name="lastModifiedBy" minOccurs="0" maxOccurs="1" type="xsd:string"/>
-        <xsd:element ref="dcterms:modified" minOccurs="0" maxOccurs="1"/>
-        <xsd:element name="contentStatus" minOccurs="0" maxOccurs="1" type="xsd:string"/>
-      </xsd:all>
-    </xsd:complexType>
-  </xsd:schema>
-  <xs:schema xmlns:pc="http://schemas.microsoft.com/office/infopath/2007/PartnerControls" xmlns:xs="http://www.w3.org/2001/XMLSchema" targetNamespace="http://schemas.microsoft.com/office/infopath/2007/PartnerControls" elementFormDefault="qualified" attributeFormDefault="unqualified">
-    <xs:element name="Person">
-      <xs:complexType>
-        <xs:sequence>
-          <xs:element ref="pc:DisplayName" minOccurs="0"/>
-          <xs:element ref="pc:AccountId" minOccurs="0"/>
-          <xs:element ref="pc:AccountType" minOccurs="0"/>
-        </xs:sequence>
-      </xs:complexType>
-    </xs:element>
-    <xs:element name="DisplayName" type="xs:string"/>
-    <xs:element name="AccountId" type="xs:string"/>
-    <xs:element name="AccountType" type="xs:string"/>
-    <xs:element name="BDCAssociatedEntity">
-      <xs:complexType>
-        <xs:sequence>
-          <xs:element ref="pc:BDCEntity" minOccurs="0" maxOccurs="unbounded"/>
-        </xs:sequence>
-        <xs:attribute ref="pc:EntityNamespace"/>
-        <xs:attribute ref="pc:EntityName"/>
-        <xs:attribute ref="pc:SystemInstanceName"/>
-        <xs:attribute ref="pc:AssociationName"/>
-      </xs:complexType>
-    </xs:element>
-    <xs:attribute name="EntityNamespace" type="xs:string"/>
-    <xs:attribute name="EntityName" type="xs:string"/>
-    <xs:attribute name="SystemInstanceName" type="xs:string"/>
-    <xs:attribute name="AssociationName" type="xs:string"/>
-    <xs:element name="BDCEntity">
-      <xs:complexType>
-        <xs:sequence>
-          <xs:element ref="pc:EntityDisplayName" minOccurs="0"/>
-          <xs:element ref="pc:EntityInstanceReference" minOccurs="0"/>
-          <xs:element ref="pc:EntityId1" minOccurs="0"/>
-          <xs:element ref="pc:EntityId2" minOccurs="0"/>
-          <xs:element ref="pc:EntityId3" minOccurs="0"/>
-          <xs:element ref="pc:EntityId4" minOccurs="0"/>
-          <xs:element ref="pc:EntityId5" minOccurs="0"/>
-        </xs:sequence>
-      </xs:complexType>
-    </xs:element>
-    <xs:element name="EntityDisplayName" type="xs:string"/>
-    <xs:element name="EntityInstanceReference" type="xs:string"/>
-    <xs:element name="EntityId1" type="xs:string"/>
-    <xs:element name="EntityId2" type="xs:string"/>
-    <xs:element name="EntityId3" type="xs:string"/>
-    <xs:element name="EntityId4" type="xs:string"/>
-    <xs:element name="EntityId5" type="xs:string"/>
-    <xs:element name="Terms">
-      <xs:complexType>
-        <xs:sequence>
-          <xs:element ref="pc:TermInfo" minOccurs="0" maxOccurs="unbounded"/>
-        </xs:sequence>
-      </xs:complexType>
-    </xs:element>
-    <xs:element name="TermInfo">
-      <xs:complexType>
-        <xs:sequence>
-          <xs:element ref="pc:TermName" minOccurs="0"/>
-          <xs:element ref="pc:TermId" minOccurs="0"/>
-        </xs:sequence>
-      </xs:complexType>
-    </xs:element>
-    <xs:element name="TermName" type="xs:string"/>
-    <xs:element name="TermId" type="xs:string"/>
-  </xs:schema>
-</ct:contentTypeSchema>
-</file>
-
-<file path=customXml/itemProps1.xml><?xml version="1.0" encoding="utf-8"?>
-<ds:datastoreItem xmlns:ds="http://schemas.openxmlformats.org/officeDocument/2006/customXml" ds:itemID="{70BA58DB-FFAE-40D6-A16C-BD547C6CD04B}">
-  <ds:schemaRefs>
-    <ds:schemaRef ds:uri="5cfd1834-9e95-4f60-8a5f-cd1a498d9d27"/>
-    <ds:schemaRef ds:uri="81a4fd39-960a-47fc-bbd5-acd63bf991a7"/>
-    <ds:schemaRef ds:uri="http://schemas.microsoft.com/office/2006/metadata/properties"/>
-    <ds:schemaRef ds:uri="http://schemas.microsoft.com/office/infopath/2007/PartnerControls"/>
-  </ds:schemaRefs>
-</ds:datastoreItem>
-</file>
-
-<file path=customXml/itemProps2.xml><?xml version="1.0" encoding="utf-8"?>
-<ds:datastoreItem xmlns:ds="http://schemas.openxmlformats.org/officeDocument/2006/customXml" ds:itemID="{F7618B81-A359-4011-AC4E-4674DB11532F}">
-  <ds:schemaRefs>
-    <ds:schemaRef ds:uri="http://schemas.microsoft.com/sharepoint/v3/contenttype/forms"/>
-  </ds:schemaRefs>
-</ds:datastoreItem>
-</file>
-
-<file path=customXml/itemProps3.xml><?xml version="1.0" encoding="utf-8"?>
-<ds:datastoreItem xmlns:ds="http://schemas.openxmlformats.org/officeDocument/2006/customXml" ds:itemID="{3A1F1B73-0CD4-45E2-95F6-036B283C7F4D}">
-  <ds:schemaRefs>
-    <ds:schemaRef ds:uri="5cfd1834-9e95-4f60-8a5f-cd1a498d9d27"/>
-    <ds:schemaRef ds:uri="81a4fd39-960a-47fc-bbd5-acd63bf991a7"/>
-    <ds:schemaRef ds:uri="http://purl.org/dc/elements/1.1/"/>
-    <ds:schemaRef ds:uri="http://purl.org/dc/terms/"/>
-    <ds:schemaRef ds:uri="http://schemas.microsoft.com/internal/obd"/>
-    <ds:schemaRef ds:uri="http://schemas.microsoft.com/office/2006/documentManagement/types"/>
-    <ds:schemaRef ds:uri="http://schemas.microsoft.com/office/2006/metadata/contentType"/>
-    <ds:schemaRef ds:uri="http://schemas.microsoft.com/office/2006/metadata/properties"/>
-    <ds:schemaRef ds:uri="http://schemas.microsoft.com/office/2006/metadata/properties/metaAttributes"/>
-    <ds:schemaRef ds:uri="http://schemas.microsoft.com/office/infopath/2007/PartnerControls"/>
-    <ds:schemaRef ds:uri="http://schemas.openxmlformats.org/package/2006/metadata/core-properties"/>
-    <ds:schemaRef ds:uri="http://www.w3.org/2001/XMLSchema"/>
-  </ds:schemaRefs>
-</ds:datastoreItem>
+<file path=ppt/theme/theme2.xml><?xml version="1.0" encoding="utf-8"?>
+<a:theme xmlns:a="http://schemas.openxmlformats.org/drawingml/2006/main" name="Office Theme">
+  <a:themeElements>
+    <a:clrScheme name="Office">
+      <a:dk1>
+        <a:sysClr val="windowText" lastClr="000000"/>
+      </a:dk1>
+      <a:lt1>
+        <a:sysClr val="window" lastClr="FFFFFF"/>
+      </a:lt1>
+      <a:dk2>
+        <a:srgbClr val="0E2841"/>
+      </a:dk2>
+      <a:lt2>
+        <a:srgbClr val="E8E8E8"/>
+      </a:lt2>
+      <a:accent1>
+        <a:srgbClr val="156082"/>
+      </a:accent1>
+      <a:accent2>
+        <a:srgbClr val="E97132"/>
+      </a:accent2>
+      <a:accent3>
+        <a:srgbClr val="196B24"/>
+      </a:accent3>
+      <a:accent4>
+        <a:srgbClr val="0F9ED5"/>
+      </a:accent4>
+      <a:accent5>
+        <a:srgbClr val="A02B93"/>
+      </a:accent5>
+      <a:accent6>
+        <a:srgbClr val="4EA72E"/>
+      </a:accent6>
+      <a:hlink>
+        <a:srgbClr val="467886"/>
+      </a:hlink>
+      <a:folHlink>
+        <a:srgbClr val="96607D"/>
+      </a:folHlink>
+    </a:clrScheme>
+    <a:fontScheme name="Office">
+      <a:majorFont>
+        <a:latin typeface="Aptos Display" panose="02110004020202020204"/>
+        <a:ea typeface=""/>
+        <a:cs typeface=""/>
+        <a:font script="Jpan" typeface="游ゴシック Light"/>
+        <a:font script="Hang" typeface="맑은 고딕"/>
+        <a:font script="Hans" typeface="等线 Light"/>
+        <a:font script="Hant" typeface="新細明體"/>
+        <a:font script="Arab" typeface="Times New Roman"/>
+        <a:font script="Hebr" typeface="Times New Roman"/>
+        <a:font script="Thai" typeface="Angsana New"/>
+        <a:font script="Ethi" typeface="Nyala"/>
+        <a:font script="Beng" typeface="Vrinda"/>
+        <a:font script="Gujr" typeface="Shruti"/>
+        <a:font script="Khmr" typeface="MoolBoran"/>
+        <a:font script="Knda" typeface="Tunga"/>
+        <a:font script="Guru" typeface="Raavi"/>
+        <a:font script="Cans" typeface="Euphemia"/>
+        <a:font script="Cher" typeface="Plantagenet Cherokee"/>
+        <a:font script="Yiii" typeface="Microsoft Yi Baiti"/>
+        <a:font script="Tibt" typeface="Microsoft Himalaya"/>
+        <a:font script="Thaa" typeface="MV Boli"/>
+        <a:font script="Deva" typeface="Mangal"/>
+        <a:font script="Telu" typeface="Gautami"/>
+        <a:font script="Taml" typeface="Latha"/>
+        <a:font script="Syrc" typeface="Estrangelo Edessa"/>
+        <a:font script="Orya" typeface="Kalinga"/>
+        <a:font script="Mlym" typeface="Kartika"/>
+        <a:font script="Laoo" typeface="DokChampa"/>
+        <a:font script="Sinh" typeface="Iskoola Pota"/>
+        <a:font script="Mong" typeface="Mongolian Baiti"/>
+        <a:font script="Viet" typeface="Times New Roman"/>
+        <a:font script="Uigh" typeface="Microsoft Uighur"/>
+        <a:font script="Geor" typeface="Sylfaen"/>
+        <a:font script="Armn" typeface="Arial"/>
+        <a:font script="Bugi" typeface="Leelawadee UI"/>
+        <a:font script="Bopo" typeface="Microsoft JhengHei"/>
+        <a:font script="Java" typeface="Javanese Text"/>
+        <a:font script="Lisu" typeface="Segoe UI"/>
+        <a:font script="Mymr" typeface="Myanmar Text"/>
+        <a:font script="Nkoo" typeface="Ebrima"/>
+        <a:font script="Olck" typeface="Nirmala UI"/>
+        <a:font script="Osma" typeface="Ebrima"/>
+        <a:font script="Phag" typeface="Phagspa"/>
+        <a:font script="Syrn" typeface="Estrangelo Edessa"/>
+        <a:font script="Syrj" typeface="Estrangelo Edessa"/>
+        <a:font script="Syre" typeface="Estrangelo Edessa"/>
+        <a:font script="Sora" typeface="Nirmala UI"/>
+        <a:font script="Tale" typeface="Microsoft Tai Le"/>
+        <a:font script="Talu" typeface="Microsoft New Tai Lue"/>
+        <a:font script="Tfng" typeface="Ebrima"/>
+      </a:majorFont>
+      <a:minorFont>
+        <a:latin typeface="Aptos" panose="02110004020202020204"/>
+        <a:ea typeface=""/>
+        <a:cs typeface=""/>
+        <a:font script="Jpan" typeface="游ゴシック"/>
+        <a:font script="Hang" typeface="맑은 고딕"/>
+        <a:font script="Hans" typeface="等线"/>
+        <a:font script="Hant" typeface="新細明體"/>
+        <a:font script="Arab" typeface="Arial"/>
+        <a:font script="Hebr" typeface="Arial"/>
+        <a:font script="Thai" typeface="Cordia New"/>
+        <a:font script="Ethi" typeface="Nyala"/>
+        <a:font script="Beng" typeface="Vrinda"/>
+        <a:font script="Gujr" typeface="Shruti"/>
+        <a:font script="Khmr" typeface="DaunPenh"/>
+        <a:font script="Knda" typeface="Tunga"/>
+        <a:font script="Guru" typeface="Raavi"/>
+        <a:font script="Cans" typeface="Euphemia"/>
+        <a:font script="Cher" typeface="Plantagenet Cherokee"/>
+        <a:font script="Yiii" typeface="Microsoft Yi Baiti"/>
+        <a:font script="Tibt" typeface="Microsoft Himalaya"/>
+        <a:font script="Thaa" typeface="MV Boli"/>
+        <a:font script="Deva" typeface="Mangal"/>
+        <a:font script="Telu" typeface="Gautami"/>
+        <a:font script="Taml" typeface="Latha"/>
+        <a:font script="Syrc" typeface="Estrangelo Edessa"/>
+        <a:font script="Orya" typeface="Kalinga"/>
+        <a:font script="Mlym" typeface="Kartika"/>
+        <a:font script="Laoo" typeface="DokChampa"/>
+        <a:font script="Sinh" typeface="Iskoola Pota"/>
+        <a:font script="Mong" typeface="Mongolian Baiti"/>
+        <a:font script="Viet" typeface="Arial"/>
+        <a:font script="Uigh" typeface="Microsoft Uighur"/>
+        <a:font script="Geor" typeface="Sylfaen"/>
+        <a:font script="Armn" typeface="Arial"/>
+        <a:font script="Bugi" typeface="Leelawadee UI"/>
+        <a:font script="Bopo" typeface="Microsoft JhengHei"/>
+        <a:font script="Java" typeface="Javanese Text"/>
+        <a:font script="Lisu" typeface="Segoe UI"/>
+        <a:font script="Mymr" typeface="Myanmar Text"/>
+        <a:font script="Nkoo" typeface="Ebrima"/>
+        <a:font script="Olck" typeface="Nirmala UI"/>
+        <a:font script="Osma" typeface="Ebrima"/>
+        <a:font script="Phag" typeface="Phagspa"/>
+        <a:font script="Syrn" typeface="Estrangelo Edessa"/>
+        <a:font script="Syrj" typeface="Estrangelo Edessa"/>
+        <a:font script="Syre" typeface="Estrangelo Edessa"/>
+        <a:font script="Sora" typeface="Nirmala UI"/>
+        <a:font script="Tale" typeface="Microsoft Tai Le"/>
+        <a:font script="Talu" typeface="Microsoft New Tai Lue"/>
+        <a:font script="Tfng" typeface="Ebrima"/>
+      </a:minorFont>
+    </a:fontScheme>
+    <a:fmtScheme name="Office">
+      <a:fillStyleLst>
+        <a:solidFill>
+          <a:schemeClr val="phClr"/>
+        </a:solidFill>
+        <a:gradFill rotWithShape="1">
+          <a:gsLst>
+            <a:gs pos="0">
+              <a:schemeClr val="phClr">
+                <a:lumMod val="110000"/>
+                <a:satMod val="105000"/>
+                <a:tint val="67000"/>
+              </a:schemeClr>
+            </a:gs>
+            <a:gs pos="50000">
+              <a:schemeClr val="phClr">
+                <a:lumMod val="105000"/>
+                <a:satMod val="103000"/>
+                <a:tint val="73000"/>
+              </a:schemeClr>
+            </a:gs>
+            <a:gs pos="100000">
+              <a:schemeClr val="phClr">
+                <a:lumMod val="105000"/>
+                <a:satMod val="109000"/>
+                <a:tint val="81000"/>
+              </a:schemeClr>
+            </a:gs>
+          </a:gsLst>
+          <a:lin ang="5400000" scaled="0"/>
+        </a:gradFill>
+        <a:gradFill rotWithShape="1">
+          <a:gsLst>
+            <a:gs pos="0">
+              <a:schemeClr val="phClr">
+                <a:satMod val="103000"/>
+                <a:lumMod val="102000"/>
+                <a:tint val="94000"/>
+              </a:schemeClr>
+            </a:gs>
+            <a:gs pos="50000">
+              <a:schemeClr val="phClr">
+                <a:satMod val="110000"/>
+                <a:lumMod val="100000"/>
+                <a:shade val="100000"/>
+              </a:schemeClr>
+            </a:gs>
+            <a:gs pos="100000">
+              <a:schemeClr val="phClr">
+                <a:lumMod val="99000"/>
+                <a:satMod val="120000"/>
+                <a:shade val="78000"/>
+              </a:schemeClr>
+            </a:gs>
+          </a:gsLst>
+          <a:lin ang="5400000" scaled="0"/>
+        </a:gradFill>
+      </a:fillStyleLst>
+      <a:lnStyleLst>
+        <a:ln w="12700" cap="flat" cmpd="sng" algn="ctr">
+          <a:solidFill>
+            <a:schemeClr val="phClr"/>
+          </a:solidFill>
+          <a:prstDash val="solid"/>
+          <a:miter lim="800000"/>
+        </a:ln>
+        <a:ln w="19050" cap="flat" cmpd="sng" algn="ctr">
+          <a:solidFill>
+            <a:schemeClr val="phClr"/>
+          </a:solidFill>
+          <a:prstDash val="solid"/>
+          <a:miter lim="800000"/>
+        </a:ln>
+        <a:ln w="25400" cap="flat" cmpd="sng" algn="ctr">
+          <a:solidFill>
+            <a:schemeClr val="phClr"/>
+          </a:solidFill>
+          <a:prstDash val="solid"/>
+          <a:miter lim="800000"/>
+        </a:ln>
+      </a:lnStyleLst>
+      <a:effectStyleLst>
+        <a:effectStyle>
+          <a:effectLst/>
+        </a:effectStyle>
+        <a:effectStyle>
+          <a:effectLst/>
+        </a:effectStyle>
+        <a:effectStyle>
+          <a:effectLst>
+            <a:outerShdw blurRad="57150" dist="19050" dir="5400000" algn="ctr" rotWithShape="0">
+              <a:srgbClr val="000000">
+                <a:alpha val="63000"/>
+              </a:srgbClr>
+            </a:outerShdw>
+          </a:effectLst>
+        </a:effectStyle>
+      </a:effectStyleLst>
+      <a:bgFillStyleLst>
+        <a:solidFill>
+          <a:schemeClr val="phClr"/>
+        </a:solidFill>
+        <a:solidFill>
+          <a:schemeClr val="phClr">
+            <a:tint val="95000"/>
+            <a:satMod val="170000"/>
+          </a:schemeClr>
+        </a:solidFill>
+        <a:gradFill rotWithShape="1">
+          <a:gsLst>
+            <a:gs pos="0">
+              <a:schemeClr val="phClr">
+                <a:tint val="93000"/>
+                <a:satMod val="150000"/>
+                <a:shade val="98000"/>
+                <a:lumMod val="102000"/>
+              </a:schemeClr>
+            </a:gs>
+            <a:gs pos="50000">
+              <a:schemeClr val="phClr">
+                <a:tint val="98000"/>
+                <a:satMod val="130000"/>
+                <a:shade val="90000"/>
+                <a:lumMod val="103000"/>
+              </a:schemeClr>
+            </a:gs>
+            <a:gs pos="100000">
+              <a:schemeClr val="phClr">
+                <a:shade val="63000"/>
+                <a:satMod val="120000"/>
+              </a:schemeClr>
+            </a:gs>
+          </a:gsLst>
+          <a:lin ang="5400000" scaled="0"/>
+        </a:gradFill>
+      </a:bgFillStyleLst>
+    </a:fmtScheme>
+  </a:themeElements>
+  <a:objectDefaults>
+    <a:lnDef>
+      <a:spPr/>
+      <a:bodyPr/>
+      <a:lstStyle/>
+      <a:style>
+        <a:lnRef idx="2">
+          <a:schemeClr val="accent1"/>
+        </a:lnRef>
+        <a:fillRef idx="0">
+          <a:schemeClr val="accent1"/>
+        </a:fillRef>
+        <a:effectRef idx="1">
+          <a:schemeClr val="accent1"/>
+        </a:effectRef>
+        <a:fontRef idx="minor">
+          <a:schemeClr val="tx1"/>
+        </a:fontRef>
+      </a:style>
+    </a:lnDef>
+  </a:objectDefaults>
+  <a:extraClrSchemeLst/>
+  <a:extLst>
+    <a:ext uri="{05A4C25C-085E-4340-85A3-A5531E510DB2}">
+      <thm15:themeFamily xmlns:thm15="http://schemas.microsoft.com/office/thememl/2012/main" name="Office Theme" id="{2E142A2C-CD16-42D6-873A-C26D2A0506FA}" vid="{1BDDFF52-6CD6-40A5-AB3C-68EB2F1E4D0A}"/>
+    </a:ext>
+  </a:extLst>
+</a:theme>
 </file>
 
 <file path=docMetadata/LabelInfo.xml><?xml version="1.0" encoding="utf-8"?>

</xml_diff>